<commit_message>
update Agile Development ppt file
</commit_message>
<xml_diff>
--- a/Agile Development.pptx
+++ b/Agile Development.pptx
@@ -13,6 +13,21 @@
     <p:sldId id="261" r:id="rId7"/>
     <p:sldId id="262" r:id="rId8"/>
     <p:sldId id="263" r:id="rId9"/>
+    <p:sldId id="264" r:id="rId10"/>
+    <p:sldId id="265" r:id="rId11"/>
+    <p:sldId id="266" r:id="rId12"/>
+    <p:sldId id="267" r:id="rId13"/>
+    <p:sldId id="268" r:id="rId14"/>
+    <p:sldId id="269" r:id="rId15"/>
+    <p:sldId id="270" r:id="rId16"/>
+    <p:sldId id="271" r:id="rId17"/>
+    <p:sldId id="272" r:id="rId18"/>
+    <p:sldId id="273" r:id="rId19"/>
+    <p:sldId id="274" r:id="rId20"/>
+    <p:sldId id="275" r:id="rId21"/>
+    <p:sldId id="276" r:id="rId22"/>
+    <p:sldId id="277" r:id="rId23"/>
+    <p:sldId id="278" r:id="rId24"/>
   </p:sldIdLst>
   <p:sldSz cx="12192000" cy="6858000"/>
   <p:notesSz cx="6858000" cy="9144000"/>
@@ -345,7 +360,7 @@
           <a:p>
             <a:fld id="{96DFF08F-DC6B-4601-B491-B0F83F6DD2DA}" type="datetimeFigureOut">
               <a:rPr lang="en-US" dirty="0"/>
-              <a:t>2/28/2019</a:t>
+              <a:t>3/1/2019</a:t>
             </a:fld>
             <a:endParaRPr lang="en-US" dirty="0"/>
           </a:p>
@@ -548,7 +563,7 @@
           <a:p>
             <a:fld id="{96DFF08F-DC6B-4601-B491-B0F83F6DD2DA}" type="datetimeFigureOut">
               <a:rPr lang="en-US" dirty="0"/>
-              <a:t>2/28/2019</a:t>
+              <a:t>3/1/2019</a:t>
             </a:fld>
             <a:endParaRPr lang="en-US" dirty="0"/>
           </a:p>
@@ -799,7 +814,7 @@
           <a:p>
             <a:fld id="{96DFF08F-DC6B-4601-B491-B0F83F6DD2DA}" type="datetimeFigureOut">
               <a:rPr lang="en-US" dirty="0"/>
-              <a:t>2/28/2019</a:t>
+              <a:t>3/1/2019</a:t>
             </a:fld>
             <a:endParaRPr lang="en-US" dirty="0"/>
           </a:p>
@@ -964,7 +979,7 @@
           <a:p>
             <a:fld id="{D62CEF3B-A037-46D0-B02C-1428F07E9383}" type="datetimeFigureOut">
               <a:rPr lang="en-US" dirty="0"/>
-              <a:t>2/28/2019</a:t>
+              <a:t>3/1/2019</a:t>
             </a:fld>
             <a:endParaRPr lang="en-US" dirty="0"/>
           </a:p>
@@ -1302,7 +1317,7 @@
           <a:p>
             <a:fld id="{96DFF08F-DC6B-4601-B491-B0F83F6DD2DA}" type="datetimeFigureOut">
               <a:rPr lang="en-US" dirty="0"/>
-              <a:t>2/28/2019</a:t>
+              <a:t>3/1/2019</a:t>
             </a:fld>
             <a:endParaRPr lang="en-US" dirty="0"/>
           </a:p>
@@ -1572,7 +1587,7 @@
           <a:p>
             <a:fld id="{96DFF08F-DC6B-4601-B491-B0F83F6DD2DA}" type="datetimeFigureOut">
               <a:rPr lang="en-US" dirty="0"/>
-              <a:t>2/28/2019</a:t>
+              <a:t>3/1/2019</a:t>
             </a:fld>
             <a:endParaRPr lang="en-US" dirty="0"/>
           </a:p>
@@ -1946,7 +1961,7 @@
           <a:p>
             <a:fld id="{96DFF08F-DC6B-4601-B491-B0F83F6DD2DA}" type="datetimeFigureOut">
               <a:rPr lang="en-US" dirty="0"/>
-              <a:t>2/28/2019</a:t>
+              <a:t>3/1/2019</a:t>
             </a:fld>
             <a:endParaRPr lang="en-US" dirty="0"/>
           </a:p>
@@ -2059,7 +2074,7 @@
           <a:p>
             <a:fld id="{96DFF08F-DC6B-4601-B491-B0F83F6DD2DA}" type="datetimeFigureOut">
               <a:rPr lang="en-US" dirty="0"/>
-              <a:t>2/28/2019</a:t>
+              <a:t>3/1/2019</a:t>
             </a:fld>
             <a:endParaRPr lang="en-US" dirty="0"/>
           </a:p>
@@ -2226,7 +2241,7 @@
             <a:fld id="{96DFF08F-DC6B-4601-B491-B0F83F6DD2DA}" type="datetimeFigureOut">
               <a:rPr lang="en-US" dirty="0"/>
               <a:pPr/>
-              <a:t>2/28/2019</a:t>
+              <a:t>3/1/2019</a:t>
             </a:fld>
             <a:endParaRPr lang="en-US" dirty="0"/>
           </a:p>
@@ -2577,7 +2592,7 @@
             <a:fld id="{96DFF08F-DC6B-4601-B491-B0F83F6DD2DA}" type="datetimeFigureOut">
               <a:rPr lang="en-US" dirty="0"/>
               <a:pPr/>
-              <a:t>2/28/2019</a:t>
+              <a:t>3/1/2019</a:t>
             </a:fld>
             <a:endParaRPr lang="en-US" dirty="0"/>
           </a:p>
@@ -2950,7 +2965,7 @@
           <a:p>
             <a:fld id="{96DFF08F-DC6B-4601-B491-B0F83F6DD2DA}" type="datetimeFigureOut">
               <a:rPr lang="en-US" dirty="0"/>
-              <a:t>2/28/2019</a:t>
+              <a:t>3/1/2019</a:t>
             </a:fld>
             <a:endParaRPr lang="en-US" dirty="0"/>
           </a:p>
@@ -3233,7 +3248,7 @@
             <a:fld id="{96DFF08F-DC6B-4601-B491-B0F83F6DD2DA}" type="datetimeFigureOut">
               <a:rPr lang="en-US" dirty="0"/>
               <a:pPr/>
-              <a:t>2/28/2019</a:t>
+              <a:t>3/1/2019</a:t>
             </a:fld>
             <a:endParaRPr lang="en-US" dirty="0"/>
           </a:p>
@@ -3791,7 +3806,7 @@
           <a:bodyPr/>
           <a:lstStyle/>
           <a:p>
-            <a:endParaRPr lang="en-US"/>
+            <a:endParaRPr lang="en-US" dirty="0"/>
           </a:p>
         </p:txBody>
       </p:sp>
@@ -3799,6 +3814,1740 @@
     <p:extLst>
       <p:ext uri="{BB962C8B-B14F-4D97-AF65-F5344CB8AC3E}">
         <p14:creationId xmlns:p14="http://schemas.microsoft.com/office/powerpoint/2010/main" val="2748802393"/>
+      </p:ext>
+    </p:extLst>
+  </p:cSld>
+  <p:clrMapOvr>
+    <a:masterClrMapping/>
+  </p:clrMapOvr>
+</p:sld>
+</file>
+
+<file path=ppt/slides/slide10.xml><?xml version="1.0" encoding="utf-8"?>
+<p:sld xmlns:a="http://schemas.openxmlformats.org/drawingml/2006/main" xmlns:r="http://schemas.openxmlformats.org/officeDocument/2006/relationships" xmlns:p="http://schemas.openxmlformats.org/presentationml/2006/main">
+  <p:cSld>
+    <p:spTree>
+      <p:nvGrpSpPr>
+        <p:cNvPr id="1" name=""/>
+        <p:cNvGrpSpPr/>
+        <p:nvPr/>
+      </p:nvGrpSpPr>
+      <p:grpSpPr>
+        <a:xfrm>
+          <a:off x="0" y="0"/>
+          <a:ext cx="0" cy="0"/>
+          <a:chOff x="0" y="0"/>
+          <a:chExt cx="0" cy="0"/>
+        </a:xfrm>
+      </p:grpSpPr>
+      <p:sp>
+        <p:nvSpPr>
+          <p:cNvPr id="2" name="Title 1"/>
+          <p:cNvSpPr>
+            <a:spLocks noGrp="1"/>
+          </p:cNvSpPr>
+          <p:nvPr>
+            <p:ph type="title"/>
+          </p:nvPr>
+        </p:nvSpPr>
+        <p:spPr/>
+        <p:txBody>
+          <a:bodyPr/>
+          <a:lstStyle/>
+          <a:p>
+            <a:r>
+              <a:rPr lang="en-US" sz="3200" b="1" dirty="0" smtClean="0">
+                <a:solidFill>
+                  <a:schemeClr val="tx1"/>
+                </a:solidFill>
+              </a:rPr>
+              <a:t>Responding to change </a:t>
+            </a:r>
+            <a:r>
+              <a:rPr lang="en-US" sz="3200" dirty="0" smtClean="0">
+                <a:solidFill>
+                  <a:schemeClr val="tx1"/>
+                </a:solidFill>
+              </a:rPr>
+              <a:t>over following a plan</a:t>
+            </a:r>
+            <a:endParaRPr lang="en-US" dirty="0"/>
+          </a:p>
+        </p:txBody>
+      </p:sp>
+      <p:sp>
+        <p:nvSpPr>
+          <p:cNvPr id="3" name="Content Placeholder 2"/>
+          <p:cNvSpPr>
+            <a:spLocks noGrp="1"/>
+          </p:cNvSpPr>
+          <p:nvPr>
+            <p:ph idx="1"/>
+          </p:nvPr>
+        </p:nvSpPr>
+        <p:spPr/>
+        <p:txBody>
+          <a:bodyPr>
+            <a:normAutofit/>
+          </a:bodyPr>
+          <a:lstStyle/>
+          <a:p>
+            <a:pPr lvl="1"/>
+            <a:r>
+              <a:rPr lang="en-US" dirty="0" smtClean="0">
+                <a:solidFill>
+                  <a:schemeClr val="tx1"/>
+                </a:solidFill>
+              </a:rPr>
+              <a:t>It is the </a:t>
+            </a:r>
+            <a:r>
+              <a:rPr lang="en-US" b="1" dirty="0" smtClean="0">
+                <a:solidFill>
+                  <a:schemeClr val="tx1"/>
+                </a:solidFill>
+              </a:rPr>
+              <a:t>ability to respond to change </a:t>
+            </a:r>
+            <a:r>
+              <a:rPr lang="en-US" dirty="0" smtClean="0">
+                <a:solidFill>
+                  <a:schemeClr val="tx1"/>
+                </a:solidFill>
+              </a:rPr>
+              <a:t>that often </a:t>
+            </a:r>
+            <a:r>
+              <a:rPr lang="en-US" b="1" dirty="0" smtClean="0">
+                <a:solidFill>
+                  <a:schemeClr val="tx1"/>
+                </a:solidFill>
+              </a:rPr>
+              <a:t>determines the </a:t>
+            </a:r>
+            <a:r>
+              <a:rPr lang="en-US" b="1" dirty="0" smtClean="0">
+                <a:solidFill>
+                  <a:srgbClr val="FF0000"/>
+                </a:solidFill>
+              </a:rPr>
+              <a:t>success</a:t>
+            </a:r>
+            <a:r>
+              <a:rPr lang="en-US" b="1" dirty="0" smtClean="0">
+                <a:solidFill>
+                  <a:schemeClr val="tx1"/>
+                </a:solidFill>
+              </a:rPr>
+              <a:t> or </a:t>
+            </a:r>
+            <a:r>
+              <a:rPr lang="en-US" b="1" dirty="0" smtClean="0">
+                <a:solidFill>
+                  <a:srgbClr val="FF0000"/>
+                </a:solidFill>
+              </a:rPr>
+              <a:t>failure </a:t>
+            </a:r>
+            <a:r>
+              <a:rPr lang="en-US" b="1" dirty="0" smtClean="0">
+                <a:solidFill>
+                  <a:schemeClr val="tx1"/>
+                </a:solidFill>
+              </a:rPr>
+              <a:t>of a software project</a:t>
+            </a:r>
+            <a:r>
+              <a:rPr lang="en-US" dirty="0" smtClean="0">
+                <a:solidFill>
+                  <a:schemeClr val="tx1"/>
+                </a:solidFill>
+              </a:rPr>
+              <a:t>.</a:t>
+            </a:r>
+          </a:p>
+          <a:p>
+            <a:pPr lvl="1"/>
+            <a:endParaRPr lang="en-US" dirty="0" smtClean="0">
+              <a:solidFill>
+                <a:schemeClr val="tx1"/>
+              </a:solidFill>
+            </a:endParaRPr>
+          </a:p>
+          <a:p>
+            <a:pPr lvl="1"/>
+            <a:r>
+              <a:rPr lang="en-US" b="1" dirty="0" smtClean="0">
+                <a:solidFill>
+                  <a:schemeClr val="tx1"/>
+                </a:solidFill>
+              </a:rPr>
+              <a:t>We cannot planned very far into the future, because</a:t>
+            </a:r>
+            <a:r>
+              <a:rPr lang="en-US" dirty="0" smtClean="0">
+                <a:solidFill>
+                  <a:schemeClr val="tx1"/>
+                </a:solidFill>
+              </a:rPr>
+              <a:t>:</a:t>
+            </a:r>
+          </a:p>
+          <a:p>
+            <a:pPr marL="544068" lvl="1" indent="-342900">
+              <a:buFont typeface="+mj-lt"/>
+              <a:buAutoNum type="arabicPeriod"/>
+            </a:pPr>
+            <a:r>
+              <a:rPr lang="en-US" dirty="0" smtClean="0">
+                <a:solidFill>
+                  <a:schemeClr val="tx1"/>
+                </a:solidFill>
+              </a:rPr>
+              <a:t>The Business environment is likely to change, causing the requirements to shift</a:t>
+            </a:r>
+          </a:p>
+          <a:p>
+            <a:pPr marL="544068" lvl="1" indent="-342900">
+              <a:buFont typeface="+mj-lt"/>
+              <a:buAutoNum type="arabicPeriod"/>
+            </a:pPr>
+            <a:r>
+              <a:rPr lang="en-US" dirty="0" smtClean="0">
+                <a:solidFill>
+                  <a:schemeClr val="tx1"/>
+                </a:solidFill>
+              </a:rPr>
+              <a:t>Customers are likely to alter the requirements once they see the system start to function.</a:t>
+            </a:r>
+          </a:p>
+          <a:p>
+            <a:pPr marL="544068" lvl="1" indent="-342900">
+              <a:buFont typeface="+mj-lt"/>
+              <a:buAutoNum type="arabicPeriod"/>
+            </a:pPr>
+            <a:r>
+              <a:rPr lang="en-US" dirty="0" smtClean="0">
+                <a:solidFill>
+                  <a:schemeClr val="tx1"/>
+                </a:solidFill>
+              </a:rPr>
+              <a:t>Even if we know the requirements, and we are sure the won’t change, we are not very good at estimating how long it will take to develop them.</a:t>
+            </a:r>
+            <a:endParaRPr lang="en-US" dirty="0" smtClean="0">
+              <a:solidFill>
+                <a:srgbClr val="FF0000"/>
+              </a:solidFill>
+            </a:endParaRPr>
+          </a:p>
+          <a:p>
+            <a:pPr lvl="1"/>
+            <a:endParaRPr lang="en-US" b="1" dirty="0" smtClean="0">
+              <a:solidFill>
+                <a:srgbClr val="FF0000"/>
+              </a:solidFill>
+            </a:endParaRPr>
+          </a:p>
+          <a:p>
+            <a:pPr lvl="1"/>
+            <a:endParaRPr lang="en-US" dirty="0" smtClean="0">
+              <a:solidFill>
+                <a:schemeClr val="tx1"/>
+              </a:solidFill>
+            </a:endParaRPr>
+          </a:p>
+        </p:txBody>
+      </p:sp>
+    </p:spTree>
+    <p:extLst>
+      <p:ext uri="{BB962C8B-B14F-4D97-AF65-F5344CB8AC3E}">
+        <p14:creationId xmlns:p14="http://schemas.microsoft.com/office/powerpoint/2010/main" val="860653948"/>
+      </p:ext>
+    </p:extLst>
+  </p:cSld>
+  <p:clrMapOvr>
+    <a:masterClrMapping/>
+  </p:clrMapOvr>
+</p:sld>
+</file>
+
+<file path=ppt/slides/slide11.xml><?xml version="1.0" encoding="utf-8"?>
+<p:sld xmlns:a="http://schemas.openxmlformats.org/drawingml/2006/main" xmlns:r="http://schemas.openxmlformats.org/officeDocument/2006/relationships" xmlns:p="http://schemas.openxmlformats.org/presentationml/2006/main">
+  <p:cSld>
+    <p:spTree>
+      <p:nvGrpSpPr>
+        <p:cNvPr id="1" name=""/>
+        <p:cNvGrpSpPr/>
+        <p:nvPr/>
+      </p:nvGrpSpPr>
+      <p:grpSpPr>
+        <a:xfrm>
+          <a:off x="0" y="0"/>
+          <a:ext cx="0" cy="0"/>
+          <a:chOff x="0" y="0"/>
+          <a:chExt cx="0" cy="0"/>
+        </a:xfrm>
+      </p:grpSpPr>
+      <p:sp>
+        <p:nvSpPr>
+          <p:cNvPr id="2" name="Title 1"/>
+          <p:cNvSpPr>
+            <a:spLocks noGrp="1"/>
+          </p:cNvSpPr>
+          <p:nvPr>
+            <p:ph type="title"/>
+          </p:nvPr>
+        </p:nvSpPr>
+        <p:spPr/>
+        <p:txBody>
+          <a:bodyPr/>
+          <a:lstStyle/>
+          <a:p>
+            <a:r>
+              <a:rPr lang="en-US" sz="3200" b="1" dirty="0" smtClean="0">
+                <a:solidFill>
+                  <a:schemeClr val="tx1"/>
+                </a:solidFill>
+              </a:rPr>
+              <a:t>Better </a:t>
+            </a:r>
+            <a:r>
+              <a:rPr lang="en-US" sz="3200" dirty="0" smtClean="0">
+                <a:solidFill>
+                  <a:schemeClr val="tx1"/>
+                </a:solidFill>
+              </a:rPr>
+              <a:t>planning strategy</a:t>
+            </a:r>
+            <a:endParaRPr lang="en-US" dirty="0"/>
+          </a:p>
+        </p:txBody>
+      </p:sp>
+      <p:sp>
+        <p:nvSpPr>
+          <p:cNvPr id="3" name="Content Placeholder 2"/>
+          <p:cNvSpPr>
+            <a:spLocks noGrp="1"/>
+          </p:cNvSpPr>
+          <p:nvPr>
+            <p:ph idx="1"/>
+          </p:nvPr>
+        </p:nvSpPr>
+        <p:spPr/>
+        <p:txBody>
+          <a:bodyPr>
+            <a:normAutofit/>
+          </a:bodyPr>
+          <a:lstStyle/>
+          <a:p>
+            <a:pPr lvl="1"/>
+            <a:r>
+              <a:rPr lang="en-US" b="1" dirty="0" smtClean="0">
+                <a:solidFill>
+                  <a:schemeClr val="tx1"/>
+                </a:solidFill>
+              </a:rPr>
+              <a:t>A better planning strategy</a:t>
+            </a:r>
+            <a:r>
+              <a:rPr lang="en-US" dirty="0" smtClean="0">
+                <a:solidFill>
+                  <a:schemeClr val="tx1"/>
+                </a:solidFill>
+              </a:rPr>
+              <a:t> is to make </a:t>
+            </a:r>
+            <a:r>
+              <a:rPr lang="en-US" sz="2400" b="1" dirty="0" smtClean="0">
+                <a:solidFill>
+                  <a:srgbClr val="FF0000"/>
+                </a:solidFill>
+              </a:rPr>
+              <a:t>detailed plans for the next two weeks</a:t>
+            </a:r>
+            <a:r>
+              <a:rPr lang="en-US" dirty="0" smtClean="0">
+                <a:solidFill>
+                  <a:schemeClr val="tx1"/>
+                </a:solidFill>
+              </a:rPr>
+              <a:t>, </a:t>
+            </a:r>
+            <a:r>
+              <a:rPr lang="en-US" sz="2400" b="1" dirty="0" smtClean="0">
+                <a:solidFill>
+                  <a:srgbClr val="FF0000"/>
+                </a:solidFill>
+              </a:rPr>
+              <a:t>very rough plans the next three month</a:t>
+            </a:r>
+            <a:r>
+              <a:rPr lang="en-US" dirty="0" smtClean="0">
+                <a:solidFill>
+                  <a:schemeClr val="tx1"/>
+                </a:solidFill>
+              </a:rPr>
+              <a:t>, and </a:t>
+            </a:r>
+            <a:r>
+              <a:rPr lang="en-US" sz="2400" b="1" dirty="0" smtClean="0">
+                <a:solidFill>
+                  <a:srgbClr val="FF0000"/>
+                </a:solidFill>
+              </a:rPr>
+              <a:t>extremely crude plans beyond that</a:t>
+            </a:r>
+            <a:r>
+              <a:rPr lang="en-US" dirty="0" smtClean="0">
+                <a:solidFill>
+                  <a:schemeClr val="tx1"/>
+                </a:solidFill>
+              </a:rPr>
+              <a:t>.</a:t>
+            </a:r>
+            <a:endParaRPr lang="en-US" dirty="0" smtClean="0">
+              <a:solidFill>
+                <a:srgbClr val="FF0000"/>
+              </a:solidFill>
+            </a:endParaRPr>
+          </a:p>
+          <a:p>
+            <a:pPr lvl="1"/>
+            <a:endParaRPr lang="en-US" b="1" dirty="0" smtClean="0">
+              <a:solidFill>
+                <a:srgbClr val="FF0000"/>
+              </a:solidFill>
+            </a:endParaRPr>
+          </a:p>
+          <a:p>
+            <a:pPr lvl="1"/>
+            <a:endParaRPr lang="en-US" dirty="0" smtClean="0">
+              <a:solidFill>
+                <a:schemeClr val="tx1"/>
+              </a:solidFill>
+            </a:endParaRPr>
+          </a:p>
+        </p:txBody>
+      </p:sp>
+    </p:spTree>
+    <p:extLst>
+      <p:ext uri="{BB962C8B-B14F-4D97-AF65-F5344CB8AC3E}">
+        <p14:creationId xmlns:p14="http://schemas.microsoft.com/office/powerpoint/2010/main" val="1737505702"/>
+      </p:ext>
+    </p:extLst>
+  </p:cSld>
+  <p:clrMapOvr>
+    <a:masterClrMapping/>
+  </p:clrMapOvr>
+</p:sld>
+</file>
+
+<file path=ppt/slides/slide12.xml><?xml version="1.0" encoding="utf-8"?>
+<p:sld xmlns:a="http://schemas.openxmlformats.org/drawingml/2006/main" xmlns:r="http://schemas.openxmlformats.org/officeDocument/2006/relationships" xmlns:p="http://schemas.openxmlformats.org/presentationml/2006/main">
+  <p:cSld>
+    <p:spTree>
+      <p:nvGrpSpPr>
+        <p:cNvPr id="1" name=""/>
+        <p:cNvGrpSpPr/>
+        <p:nvPr/>
+      </p:nvGrpSpPr>
+      <p:grpSpPr>
+        <a:xfrm>
+          <a:off x="0" y="0"/>
+          <a:ext cx="0" cy="0"/>
+          <a:chOff x="0" y="0"/>
+          <a:chExt cx="0" cy="0"/>
+        </a:xfrm>
+      </p:grpSpPr>
+      <p:sp>
+        <p:nvSpPr>
+          <p:cNvPr id="2" name="Title 1"/>
+          <p:cNvSpPr>
+            <a:spLocks noGrp="1"/>
+          </p:cNvSpPr>
+          <p:nvPr>
+            <p:ph type="title"/>
+          </p:nvPr>
+        </p:nvSpPr>
+        <p:spPr/>
+        <p:txBody>
+          <a:bodyPr/>
+          <a:lstStyle/>
+          <a:p>
+            <a:r>
+              <a:rPr lang="en-US" sz="3200" b="1" dirty="0" smtClean="0">
+                <a:solidFill>
+                  <a:schemeClr val="tx1"/>
+                </a:solidFill>
+              </a:rPr>
+              <a:t>Agile principles</a:t>
+            </a:r>
+            <a:endParaRPr lang="en-US" dirty="0"/>
+          </a:p>
+        </p:txBody>
+      </p:sp>
+      <p:sp>
+        <p:nvSpPr>
+          <p:cNvPr id="3" name="Content Placeholder 2"/>
+          <p:cNvSpPr>
+            <a:spLocks noGrp="1"/>
+          </p:cNvSpPr>
+          <p:nvPr>
+            <p:ph idx="1"/>
+          </p:nvPr>
+        </p:nvSpPr>
+        <p:spPr/>
+        <p:txBody>
+          <a:bodyPr>
+            <a:normAutofit/>
+          </a:bodyPr>
+          <a:lstStyle/>
+          <a:p>
+            <a:pPr lvl="1"/>
+            <a:r>
+              <a:rPr lang="en-US" sz="2400" b="1" dirty="0" smtClean="0">
+                <a:solidFill>
+                  <a:schemeClr val="tx1"/>
+                </a:solidFill>
+              </a:rPr>
+              <a:t>1- Our highest priority is to satisfy the custome</a:t>
+            </a:r>
+            <a:r>
+              <a:rPr lang="en-US" sz="2400" b="1" dirty="0" smtClean="0">
+                <a:solidFill>
+                  <a:schemeClr val="tx1"/>
+                </a:solidFill>
+              </a:rPr>
+              <a:t>r through </a:t>
+            </a:r>
+            <a:r>
+              <a:rPr lang="en-US" sz="2400" b="1" dirty="0" smtClean="0">
+                <a:solidFill>
+                  <a:srgbClr val="FF0000"/>
+                </a:solidFill>
+              </a:rPr>
+              <a:t>early</a:t>
+            </a:r>
+            <a:r>
+              <a:rPr lang="en-US" sz="2400" b="1" dirty="0" smtClean="0">
+                <a:solidFill>
+                  <a:schemeClr val="tx1"/>
+                </a:solidFill>
+              </a:rPr>
+              <a:t> and </a:t>
+            </a:r>
+            <a:r>
+              <a:rPr lang="en-US" sz="2400" b="1" dirty="0" smtClean="0">
+                <a:solidFill>
+                  <a:srgbClr val="FF0000"/>
+                </a:solidFill>
+              </a:rPr>
+              <a:t>continuous delivery of valuable software</a:t>
+            </a:r>
+            <a:r>
+              <a:rPr lang="en-US" sz="2400" b="1" dirty="0" smtClean="0">
+                <a:solidFill>
+                  <a:schemeClr val="tx1"/>
+                </a:solidFill>
+              </a:rPr>
+              <a:t>.</a:t>
+            </a:r>
+          </a:p>
+          <a:p>
+            <a:pPr lvl="1"/>
+            <a:endParaRPr lang="en-US" sz="2400" b="1" dirty="0">
+              <a:solidFill>
+                <a:schemeClr val="tx1"/>
+              </a:solidFill>
+            </a:endParaRPr>
+          </a:p>
+          <a:p>
+            <a:pPr lvl="1"/>
+            <a:r>
+              <a:rPr lang="en-US" dirty="0" smtClean="0">
+                <a:solidFill>
+                  <a:schemeClr val="tx1"/>
+                </a:solidFill>
+              </a:rPr>
+              <a:t>We strive to deliver rudimentary system within the first few weeks of the start of the project. Then, we strive to continue to delivers systems of increasing functionality every two weeks.</a:t>
+            </a:r>
+            <a:endParaRPr lang="en-US" dirty="0" smtClean="0">
+              <a:solidFill>
+                <a:schemeClr val="tx1"/>
+              </a:solidFill>
+            </a:endParaRPr>
+          </a:p>
+        </p:txBody>
+      </p:sp>
+    </p:spTree>
+    <p:extLst>
+      <p:ext uri="{BB962C8B-B14F-4D97-AF65-F5344CB8AC3E}">
+        <p14:creationId xmlns:p14="http://schemas.microsoft.com/office/powerpoint/2010/main" val="4243998663"/>
+      </p:ext>
+    </p:extLst>
+  </p:cSld>
+  <p:clrMapOvr>
+    <a:masterClrMapping/>
+  </p:clrMapOvr>
+</p:sld>
+</file>
+
+<file path=ppt/slides/slide13.xml><?xml version="1.0" encoding="utf-8"?>
+<p:sld xmlns:a="http://schemas.openxmlformats.org/drawingml/2006/main" xmlns:r="http://schemas.openxmlformats.org/officeDocument/2006/relationships" xmlns:p="http://schemas.openxmlformats.org/presentationml/2006/main">
+  <p:cSld>
+    <p:spTree>
+      <p:nvGrpSpPr>
+        <p:cNvPr id="1" name=""/>
+        <p:cNvGrpSpPr/>
+        <p:nvPr/>
+      </p:nvGrpSpPr>
+      <p:grpSpPr>
+        <a:xfrm>
+          <a:off x="0" y="0"/>
+          <a:ext cx="0" cy="0"/>
+          <a:chOff x="0" y="0"/>
+          <a:chExt cx="0" cy="0"/>
+        </a:xfrm>
+      </p:grpSpPr>
+      <p:sp>
+        <p:nvSpPr>
+          <p:cNvPr id="2" name="Title 1"/>
+          <p:cNvSpPr>
+            <a:spLocks noGrp="1"/>
+          </p:cNvSpPr>
+          <p:nvPr>
+            <p:ph type="title"/>
+          </p:nvPr>
+        </p:nvSpPr>
+        <p:spPr/>
+        <p:txBody>
+          <a:bodyPr/>
+          <a:lstStyle/>
+          <a:p>
+            <a:r>
+              <a:rPr lang="en-US" sz="3200" b="1" dirty="0" smtClean="0">
+                <a:solidFill>
+                  <a:schemeClr val="tx1"/>
+                </a:solidFill>
+              </a:rPr>
+              <a:t>Agile principles</a:t>
+            </a:r>
+            <a:endParaRPr lang="en-US" dirty="0"/>
+          </a:p>
+        </p:txBody>
+      </p:sp>
+      <p:sp>
+        <p:nvSpPr>
+          <p:cNvPr id="3" name="Content Placeholder 2"/>
+          <p:cNvSpPr>
+            <a:spLocks noGrp="1"/>
+          </p:cNvSpPr>
+          <p:nvPr>
+            <p:ph idx="1"/>
+          </p:nvPr>
+        </p:nvSpPr>
+        <p:spPr/>
+        <p:txBody>
+          <a:bodyPr>
+            <a:normAutofit/>
+          </a:bodyPr>
+          <a:lstStyle/>
+          <a:p>
+            <a:pPr lvl="1"/>
+            <a:r>
+              <a:rPr lang="en-US" sz="2400" b="1" dirty="0" smtClean="0">
+                <a:solidFill>
+                  <a:schemeClr val="tx1"/>
+                </a:solidFill>
+              </a:rPr>
+              <a:t>2- </a:t>
+            </a:r>
+            <a:r>
+              <a:rPr lang="en-US" sz="2400" b="1" dirty="0" smtClean="0">
+                <a:solidFill>
+                  <a:srgbClr val="FF0000"/>
+                </a:solidFill>
+              </a:rPr>
+              <a:t>Welcome changing requirements, even late in development</a:t>
+            </a:r>
+            <a:r>
+              <a:rPr lang="en-US" sz="2400" b="1" dirty="0" smtClean="0">
+                <a:solidFill>
+                  <a:schemeClr val="tx1"/>
+                </a:solidFill>
+              </a:rPr>
+              <a:t>. Agile processes harness change for the customer’s competitive advantage.</a:t>
+            </a:r>
+            <a:endParaRPr lang="en-US" sz="2400" b="1" dirty="0" smtClean="0">
+              <a:solidFill>
+                <a:schemeClr val="tx1"/>
+              </a:solidFill>
+            </a:endParaRPr>
+          </a:p>
+          <a:p>
+            <a:pPr lvl="1"/>
+            <a:endParaRPr lang="en-US" sz="2400" b="1" dirty="0">
+              <a:solidFill>
+                <a:schemeClr val="tx1"/>
+              </a:solidFill>
+            </a:endParaRPr>
+          </a:p>
+          <a:p>
+            <a:pPr lvl="1"/>
+            <a:r>
+              <a:rPr lang="en-US" dirty="0" smtClean="0">
+                <a:solidFill>
+                  <a:schemeClr val="tx1"/>
+                </a:solidFill>
+              </a:rPr>
+              <a:t>We should keep the structure of software flexible so that when requirements change, the impact to the system is minimal. We will learn the </a:t>
+            </a:r>
+            <a:r>
+              <a:rPr lang="en-US" b="1" dirty="0" smtClean="0">
+                <a:solidFill>
+                  <a:schemeClr val="tx1"/>
+                </a:solidFill>
+              </a:rPr>
+              <a:t>principles and patterns of object oriented design that help us to maintain this kind of flexibility</a:t>
+            </a:r>
+            <a:r>
+              <a:rPr lang="en-US" dirty="0" smtClean="0">
+                <a:solidFill>
+                  <a:schemeClr val="tx1"/>
+                </a:solidFill>
+              </a:rPr>
+              <a:t>.</a:t>
+            </a:r>
+            <a:endParaRPr lang="en-US" dirty="0" smtClean="0">
+              <a:solidFill>
+                <a:schemeClr val="tx1"/>
+              </a:solidFill>
+            </a:endParaRPr>
+          </a:p>
+        </p:txBody>
+      </p:sp>
+    </p:spTree>
+    <p:extLst>
+      <p:ext uri="{BB962C8B-B14F-4D97-AF65-F5344CB8AC3E}">
+        <p14:creationId xmlns:p14="http://schemas.microsoft.com/office/powerpoint/2010/main" val="3547838475"/>
+      </p:ext>
+    </p:extLst>
+  </p:cSld>
+  <p:clrMapOvr>
+    <a:masterClrMapping/>
+  </p:clrMapOvr>
+</p:sld>
+</file>
+
+<file path=ppt/slides/slide14.xml><?xml version="1.0" encoding="utf-8"?>
+<p:sld xmlns:a="http://schemas.openxmlformats.org/drawingml/2006/main" xmlns:r="http://schemas.openxmlformats.org/officeDocument/2006/relationships" xmlns:p="http://schemas.openxmlformats.org/presentationml/2006/main">
+  <p:cSld>
+    <p:spTree>
+      <p:nvGrpSpPr>
+        <p:cNvPr id="1" name=""/>
+        <p:cNvGrpSpPr/>
+        <p:nvPr/>
+      </p:nvGrpSpPr>
+      <p:grpSpPr>
+        <a:xfrm>
+          <a:off x="0" y="0"/>
+          <a:ext cx="0" cy="0"/>
+          <a:chOff x="0" y="0"/>
+          <a:chExt cx="0" cy="0"/>
+        </a:xfrm>
+      </p:grpSpPr>
+      <p:sp>
+        <p:nvSpPr>
+          <p:cNvPr id="2" name="Title 1"/>
+          <p:cNvSpPr>
+            <a:spLocks noGrp="1"/>
+          </p:cNvSpPr>
+          <p:nvPr>
+            <p:ph type="title"/>
+          </p:nvPr>
+        </p:nvSpPr>
+        <p:spPr/>
+        <p:txBody>
+          <a:bodyPr/>
+          <a:lstStyle/>
+          <a:p>
+            <a:r>
+              <a:rPr lang="en-US" sz="3200" b="1" dirty="0" smtClean="0">
+                <a:solidFill>
+                  <a:schemeClr val="tx1"/>
+                </a:solidFill>
+              </a:rPr>
+              <a:t>Agile principles</a:t>
+            </a:r>
+            <a:endParaRPr lang="en-US" dirty="0"/>
+          </a:p>
+        </p:txBody>
+      </p:sp>
+      <p:sp>
+        <p:nvSpPr>
+          <p:cNvPr id="3" name="Content Placeholder 2"/>
+          <p:cNvSpPr>
+            <a:spLocks noGrp="1"/>
+          </p:cNvSpPr>
+          <p:nvPr>
+            <p:ph idx="1"/>
+          </p:nvPr>
+        </p:nvSpPr>
+        <p:spPr/>
+        <p:txBody>
+          <a:bodyPr>
+            <a:normAutofit/>
+          </a:bodyPr>
+          <a:lstStyle/>
+          <a:p>
+            <a:pPr lvl="1"/>
+            <a:r>
+              <a:rPr lang="en-US" sz="2400" b="1" dirty="0" smtClean="0">
+                <a:solidFill>
+                  <a:schemeClr val="tx1"/>
+                </a:solidFill>
+              </a:rPr>
+              <a:t>3- </a:t>
+            </a:r>
+            <a:r>
+              <a:rPr lang="en-US" sz="2400" b="1" dirty="0" smtClean="0">
+                <a:solidFill>
+                  <a:srgbClr val="FF0000"/>
+                </a:solidFill>
+              </a:rPr>
+              <a:t>Deliver working software frequently</a:t>
+            </a:r>
+            <a:r>
+              <a:rPr lang="en-US" sz="2400" b="1" dirty="0" smtClean="0">
+                <a:solidFill>
+                  <a:schemeClr val="tx1"/>
+                </a:solidFill>
+              </a:rPr>
+              <a:t>, from a couple of weeks to a couple of month, with a preference to the shorter time scale.</a:t>
+            </a:r>
+            <a:endParaRPr lang="en-US" sz="2400" b="1" dirty="0" smtClean="0">
+              <a:solidFill>
+                <a:schemeClr val="tx1"/>
+              </a:solidFill>
+            </a:endParaRPr>
+          </a:p>
+          <a:p>
+            <a:pPr lvl="1"/>
+            <a:endParaRPr lang="en-US" sz="2400" b="1" dirty="0">
+              <a:solidFill>
+                <a:schemeClr val="tx1"/>
+              </a:solidFill>
+            </a:endParaRPr>
+          </a:p>
+          <a:p>
+            <a:pPr lvl="1"/>
+            <a:r>
+              <a:rPr lang="en-US" dirty="0" smtClean="0">
+                <a:solidFill>
+                  <a:schemeClr val="tx1"/>
+                </a:solidFill>
+              </a:rPr>
+              <a:t>We are </a:t>
+            </a:r>
+            <a:r>
+              <a:rPr lang="en-US" b="1" dirty="0" smtClean="0">
+                <a:solidFill>
+                  <a:schemeClr val="tx1"/>
+                </a:solidFill>
+              </a:rPr>
+              <a:t>not</a:t>
+            </a:r>
+            <a:r>
+              <a:rPr lang="en-US" dirty="0" smtClean="0">
+                <a:solidFill>
+                  <a:schemeClr val="tx1"/>
+                </a:solidFill>
+              </a:rPr>
+              <a:t> content with delivering </a:t>
+            </a:r>
+            <a:r>
+              <a:rPr lang="en-US" b="1" dirty="0" smtClean="0">
+                <a:solidFill>
+                  <a:schemeClr val="tx1"/>
+                </a:solidFill>
+              </a:rPr>
+              <a:t>bundles of documents or plans</a:t>
+            </a:r>
+            <a:r>
+              <a:rPr lang="en-US" dirty="0" smtClean="0">
+                <a:solidFill>
+                  <a:schemeClr val="tx1"/>
+                </a:solidFill>
+              </a:rPr>
+              <a:t>.</a:t>
+            </a:r>
+          </a:p>
+          <a:p>
+            <a:pPr lvl="1"/>
+            <a:r>
+              <a:rPr lang="en-US" dirty="0" smtClean="0">
+                <a:solidFill>
+                  <a:schemeClr val="tx1"/>
+                </a:solidFill>
+              </a:rPr>
+              <a:t>Our eye is on the goal of delivering software that satisfies the customers’ needs.</a:t>
+            </a:r>
+            <a:endParaRPr lang="en-US" dirty="0" smtClean="0">
+              <a:solidFill>
+                <a:schemeClr val="tx1"/>
+              </a:solidFill>
+            </a:endParaRPr>
+          </a:p>
+        </p:txBody>
+      </p:sp>
+    </p:spTree>
+    <p:extLst>
+      <p:ext uri="{BB962C8B-B14F-4D97-AF65-F5344CB8AC3E}">
+        <p14:creationId xmlns:p14="http://schemas.microsoft.com/office/powerpoint/2010/main" val="4159166944"/>
+      </p:ext>
+    </p:extLst>
+  </p:cSld>
+  <p:clrMapOvr>
+    <a:masterClrMapping/>
+  </p:clrMapOvr>
+</p:sld>
+</file>
+
+<file path=ppt/slides/slide15.xml><?xml version="1.0" encoding="utf-8"?>
+<p:sld xmlns:a="http://schemas.openxmlformats.org/drawingml/2006/main" xmlns:r="http://schemas.openxmlformats.org/officeDocument/2006/relationships" xmlns:p="http://schemas.openxmlformats.org/presentationml/2006/main">
+  <p:cSld>
+    <p:spTree>
+      <p:nvGrpSpPr>
+        <p:cNvPr id="1" name=""/>
+        <p:cNvGrpSpPr/>
+        <p:nvPr/>
+      </p:nvGrpSpPr>
+      <p:grpSpPr>
+        <a:xfrm>
+          <a:off x="0" y="0"/>
+          <a:ext cx="0" cy="0"/>
+          <a:chOff x="0" y="0"/>
+          <a:chExt cx="0" cy="0"/>
+        </a:xfrm>
+      </p:grpSpPr>
+      <p:sp>
+        <p:nvSpPr>
+          <p:cNvPr id="2" name="Title 1"/>
+          <p:cNvSpPr>
+            <a:spLocks noGrp="1"/>
+          </p:cNvSpPr>
+          <p:nvPr>
+            <p:ph type="title"/>
+          </p:nvPr>
+        </p:nvSpPr>
+        <p:spPr/>
+        <p:txBody>
+          <a:bodyPr/>
+          <a:lstStyle/>
+          <a:p>
+            <a:r>
+              <a:rPr lang="en-US" sz="3200" b="1" dirty="0" smtClean="0">
+                <a:solidFill>
+                  <a:schemeClr val="tx1"/>
+                </a:solidFill>
+              </a:rPr>
+              <a:t>Agile principles</a:t>
+            </a:r>
+            <a:endParaRPr lang="en-US" dirty="0"/>
+          </a:p>
+        </p:txBody>
+      </p:sp>
+      <p:sp>
+        <p:nvSpPr>
+          <p:cNvPr id="3" name="Content Placeholder 2"/>
+          <p:cNvSpPr>
+            <a:spLocks noGrp="1"/>
+          </p:cNvSpPr>
+          <p:nvPr>
+            <p:ph idx="1"/>
+          </p:nvPr>
+        </p:nvSpPr>
+        <p:spPr/>
+        <p:txBody>
+          <a:bodyPr>
+            <a:normAutofit/>
+          </a:bodyPr>
+          <a:lstStyle/>
+          <a:p>
+            <a:pPr lvl="1"/>
+            <a:r>
+              <a:rPr lang="en-US" sz="2400" b="1" dirty="0" smtClean="0">
+                <a:solidFill>
+                  <a:schemeClr val="tx1"/>
+                </a:solidFill>
+              </a:rPr>
+              <a:t>4- </a:t>
+            </a:r>
+            <a:r>
+              <a:rPr lang="en-US" sz="2400" b="1" dirty="0" smtClean="0">
+                <a:solidFill>
+                  <a:srgbClr val="FF0000"/>
+                </a:solidFill>
+              </a:rPr>
+              <a:t>Business people </a:t>
+            </a:r>
+            <a:r>
+              <a:rPr lang="en-US" sz="2400" b="1" dirty="0" smtClean="0">
+                <a:solidFill>
+                  <a:schemeClr val="tx1"/>
+                </a:solidFill>
+              </a:rPr>
+              <a:t>and </a:t>
+            </a:r>
+            <a:r>
+              <a:rPr lang="en-US" sz="2400" b="1" dirty="0" smtClean="0">
+                <a:solidFill>
+                  <a:srgbClr val="FF0000"/>
+                </a:solidFill>
+              </a:rPr>
+              <a:t>developers</a:t>
+            </a:r>
+            <a:r>
+              <a:rPr lang="en-US" sz="2400" b="1" dirty="0" smtClean="0">
+                <a:solidFill>
+                  <a:schemeClr val="tx1"/>
+                </a:solidFill>
+              </a:rPr>
+              <a:t> must </a:t>
+            </a:r>
+            <a:r>
+              <a:rPr lang="en-US" sz="2400" b="1" dirty="0" smtClean="0">
+                <a:solidFill>
+                  <a:srgbClr val="FF0000"/>
+                </a:solidFill>
+              </a:rPr>
+              <a:t>work together </a:t>
+            </a:r>
+            <a:r>
+              <a:rPr lang="en-US" sz="2400" b="1" dirty="0" smtClean="0">
+                <a:solidFill>
+                  <a:schemeClr val="tx1"/>
+                </a:solidFill>
+              </a:rPr>
+              <a:t>daily throughout the project.</a:t>
+            </a:r>
+            <a:endParaRPr lang="en-US" sz="2400" b="1" dirty="0" smtClean="0">
+              <a:solidFill>
+                <a:schemeClr val="tx1"/>
+              </a:solidFill>
+            </a:endParaRPr>
+          </a:p>
+          <a:p>
+            <a:pPr lvl="1"/>
+            <a:endParaRPr lang="en-US" sz="2400" b="1" dirty="0">
+              <a:solidFill>
+                <a:schemeClr val="tx1"/>
+              </a:solidFill>
+            </a:endParaRPr>
+          </a:p>
+          <a:p>
+            <a:pPr lvl="1"/>
+            <a:r>
+              <a:rPr lang="en-US" b="1" dirty="0" smtClean="0">
+                <a:solidFill>
+                  <a:schemeClr val="tx1"/>
+                </a:solidFill>
+              </a:rPr>
+              <a:t>In order for a project to be agile</a:t>
+            </a:r>
+            <a:r>
+              <a:rPr lang="en-US" dirty="0" smtClean="0">
+                <a:solidFill>
+                  <a:schemeClr val="tx1"/>
+                </a:solidFill>
+              </a:rPr>
+              <a:t>, there must be significant and </a:t>
+            </a:r>
+            <a:r>
+              <a:rPr lang="en-US" b="1" dirty="0" smtClean="0">
+                <a:solidFill>
+                  <a:schemeClr val="tx1"/>
+                </a:solidFill>
+              </a:rPr>
+              <a:t>frequent interaction between the customers, developers and stakeholders</a:t>
+            </a:r>
+            <a:r>
+              <a:rPr lang="en-US" dirty="0" smtClean="0">
+                <a:solidFill>
+                  <a:schemeClr val="tx1"/>
+                </a:solidFill>
+              </a:rPr>
+              <a:t>.</a:t>
+            </a:r>
+            <a:endParaRPr lang="en-US" dirty="0" smtClean="0">
+              <a:solidFill>
+                <a:schemeClr val="tx1"/>
+              </a:solidFill>
+            </a:endParaRPr>
+          </a:p>
+        </p:txBody>
+      </p:sp>
+    </p:spTree>
+    <p:extLst>
+      <p:ext uri="{BB962C8B-B14F-4D97-AF65-F5344CB8AC3E}">
+        <p14:creationId xmlns:p14="http://schemas.microsoft.com/office/powerpoint/2010/main" val="3564536061"/>
+      </p:ext>
+    </p:extLst>
+  </p:cSld>
+  <p:clrMapOvr>
+    <a:masterClrMapping/>
+  </p:clrMapOvr>
+</p:sld>
+</file>
+
+<file path=ppt/slides/slide16.xml><?xml version="1.0" encoding="utf-8"?>
+<p:sld xmlns:a="http://schemas.openxmlformats.org/drawingml/2006/main" xmlns:r="http://schemas.openxmlformats.org/officeDocument/2006/relationships" xmlns:p="http://schemas.openxmlformats.org/presentationml/2006/main">
+  <p:cSld>
+    <p:spTree>
+      <p:nvGrpSpPr>
+        <p:cNvPr id="1" name=""/>
+        <p:cNvGrpSpPr/>
+        <p:nvPr/>
+      </p:nvGrpSpPr>
+      <p:grpSpPr>
+        <a:xfrm>
+          <a:off x="0" y="0"/>
+          <a:ext cx="0" cy="0"/>
+          <a:chOff x="0" y="0"/>
+          <a:chExt cx="0" cy="0"/>
+        </a:xfrm>
+      </p:grpSpPr>
+      <p:sp>
+        <p:nvSpPr>
+          <p:cNvPr id="2" name="Title 1"/>
+          <p:cNvSpPr>
+            <a:spLocks noGrp="1"/>
+          </p:cNvSpPr>
+          <p:nvPr>
+            <p:ph type="title"/>
+          </p:nvPr>
+        </p:nvSpPr>
+        <p:spPr/>
+        <p:txBody>
+          <a:bodyPr/>
+          <a:lstStyle/>
+          <a:p>
+            <a:r>
+              <a:rPr lang="en-US" sz="3200" b="1" dirty="0" smtClean="0">
+                <a:solidFill>
+                  <a:schemeClr val="tx1"/>
+                </a:solidFill>
+              </a:rPr>
+              <a:t>Agile principles</a:t>
+            </a:r>
+            <a:endParaRPr lang="en-US" dirty="0"/>
+          </a:p>
+        </p:txBody>
+      </p:sp>
+      <p:sp>
+        <p:nvSpPr>
+          <p:cNvPr id="3" name="Content Placeholder 2"/>
+          <p:cNvSpPr>
+            <a:spLocks noGrp="1"/>
+          </p:cNvSpPr>
+          <p:nvPr>
+            <p:ph idx="1"/>
+          </p:nvPr>
+        </p:nvSpPr>
+        <p:spPr/>
+        <p:txBody>
+          <a:bodyPr>
+            <a:normAutofit/>
+          </a:bodyPr>
+          <a:lstStyle/>
+          <a:p>
+            <a:pPr lvl="1"/>
+            <a:r>
+              <a:rPr lang="en-US" sz="2400" b="1" dirty="0" smtClean="0">
+                <a:solidFill>
+                  <a:schemeClr val="tx1"/>
+                </a:solidFill>
+              </a:rPr>
+              <a:t>5- </a:t>
+            </a:r>
+            <a:r>
+              <a:rPr lang="en-US" sz="2400" b="1" dirty="0" smtClean="0">
+                <a:solidFill>
+                  <a:srgbClr val="FF0000"/>
+                </a:solidFill>
+              </a:rPr>
+              <a:t>Build project around motivated individuals</a:t>
+            </a:r>
+            <a:r>
+              <a:rPr lang="en-US" sz="2400" b="1" dirty="0" smtClean="0">
+                <a:solidFill>
+                  <a:schemeClr val="tx1"/>
+                </a:solidFill>
+              </a:rPr>
+              <a:t>. Give them the environment and support the need, and trust them to get the job done.</a:t>
+            </a:r>
+          </a:p>
+          <a:p>
+            <a:pPr lvl="1"/>
+            <a:endParaRPr lang="en-US" sz="2400" b="1" dirty="0">
+              <a:solidFill>
+                <a:schemeClr val="tx1"/>
+              </a:solidFill>
+            </a:endParaRPr>
+          </a:p>
+          <a:p>
+            <a:pPr lvl="1"/>
+            <a:r>
+              <a:rPr lang="en-US" dirty="0" smtClean="0">
+                <a:solidFill>
+                  <a:schemeClr val="tx1"/>
+                </a:solidFill>
+              </a:rPr>
+              <a:t>An agile project is one in which people are considered the </a:t>
+            </a:r>
+            <a:r>
+              <a:rPr lang="en-US" b="1" dirty="0" smtClean="0">
+                <a:solidFill>
+                  <a:schemeClr val="tx1"/>
+                </a:solidFill>
+              </a:rPr>
+              <a:t>most important factor of success</a:t>
+            </a:r>
+            <a:r>
+              <a:rPr lang="en-US" dirty="0" smtClean="0">
+                <a:solidFill>
+                  <a:schemeClr val="tx1"/>
+                </a:solidFill>
+              </a:rPr>
+              <a:t>.</a:t>
+            </a:r>
+            <a:endParaRPr lang="en-US" dirty="0" smtClean="0">
+              <a:solidFill>
+                <a:schemeClr val="tx1"/>
+              </a:solidFill>
+            </a:endParaRPr>
+          </a:p>
+        </p:txBody>
+      </p:sp>
+    </p:spTree>
+    <p:extLst>
+      <p:ext uri="{BB962C8B-B14F-4D97-AF65-F5344CB8AC3E}">
+        <p14:creationId xmlns:p14="http://schemas.microsoft.com/office/powerpoint/2010/main" val="81437376"/>
+      </p:ext>
+    </p:extLst>
+  </p:cSld>
+  <p:clrMapOvr>
+    <a:masterClrMapping/>
+  </p:clrMapOvr>
+</p:sld>
+</file>
+
+<file path=ppt/slides/slide17.xml><?xml version="1.0" encoding="utf-8"?>
+<p:sld xmlns:a="http://schemas.openxmlformats.org/drawingml/2006/main" xmlns:r="http://schemas.openxmlformats.org/officeDocument/2006/relationships" xmlns:p="http://schemas.openxmlformats.org/presentationml/2006/main">
+  <p:cSld>
+    <p:spTree>
+      <p:nvGrpSpPr>
+        <p:cNvPr id="1" name=""/>
+        <p:cNvGrpSpPr/>
+        <p:nvPr/>
+      </p:nvGrpSpPr>
+      <p:grpSpPr>
+        <a:xfrm>
+          <a:off x="0" y="0"/>
+          <a:ext cx="0" cy="0"/>
+          <a:chOff x="0" y="0"/>
+          <a:chExt cx="0" cy="0"/>
+        </a:xfrm>
+      </p:grpSpPr>
+      <p:sp>
+        <p:nvSpPr>
+          <p:cNvPr id="2" name="Title 1"/>
+          <p:cNvSpPr>
+            <a:spLocks noGrp="1"/>
+          </p:cNvSpPr>
+          <p:nvPr>
+            <p:ph type="title"/>
+          </p:nvPr>
+        </p:nvSpPr>
+        <p:spPr/>
+        <p:txBody>
+          <a:bodyPr/>
+          <a:lstStyle/>
+          <a:p>
+            <a:r>
+              <a:rPr lang="en-US" sz="3200" b="1" dirty="0" smtClean="0">
+                <a:solidFill>
+                  <a:schemeClr val="tx1"/>
+                </a:solidFill>
+              </a:rPr>
+              <a:t>Agile principles</a:t>
+            </a:r>
+            <a:endParaRPr lang="en-US" dirty="0"/>
+          </a:p>
+        </p:txBody>
+      </p:sp>
+      <p:sp>
+        <p:nvSpPr>
+          <p:cNvPr id="3" name="Content Placeholder 2"/>
+          <p:cNvSpPr>
+            <a:spLocks noGrp="1"/>
+          </p:cNvSpPr>
+          <p:nvPr>
+            <p:ph idx="1"/>
+          </p:nvPr>
+        </p:nvSpPr>
+        <p:spPr/>
+        <p:txBody>
+          <a:bodyPr>
+            <a:normAutofit/>
+          </a:bodyPr>
+          <a:lstStyle/>
+          <a:p>
+            <a:pPr lvl="1"/>
+            <a:r>
+              <a:rPr lang="en-US" sz="2400" b="1" dirty="0" smtClean="0">
+                <a:solidFill>
+                  <a:schemeClr val="tx1"/>
+                </a:solidFill>
+              </a:rPr>
+              <a:t>6- </a:t>
+            </a:r>
+            <a:r>
+              <a:rPr lang="en-US" sz="2400" b="1" dirty="0" smtClean="0">
+                <a:solidFill>
+                  <a:srgbClr val="FF0000"/>
+                </a:solidFill>
+              </a:rPr>
+              <a:t>The most efficient and effective method of conveying information </a:t>
+            </a:r>
+            <a:r>
+              <a:rPr lang="en-US" sz="2400" b="1" dirty="0" smtClean="0">
+                <a:solidFill>
+                  <a:schemeClr val="tx1"/>
+                </a:solidFill>
+              </a:rPr>
+              <a:t>to and within a development team is </a:t>
+            </a:r>
+            <a:r>
+              <a:rPr lang="en-US" sz="2400" b="1" dirty="0" smtClean="0">
+                <a:solidFill>
+                  <a:srgbClr val="FF0000"/>
+                </a:solidFill>
+              </a:rPr>
+              <a:t>face-to-face conversation</a:t>
+            </a:r>
+            <a:r>
+              <a:rPr lang="en-US" sz="2400" b="1" dirty="0" smtClean="0">
+                <a:solidFill>
+                  <a:schemeClr val="tx1"/>
+                </a:solidFill>
+              </a:rPr>
+              <a:t>.</a:t>
+            </a:r>
+          </a:p>
+          <a:p>
+            <a:pPr lvl="1"/>
+            <a:endParaRPr lang="en-US" sz="2400" b="1" dirty="0">
+              <a:solidFill>
+                <a:schemeClr val="tx1"/>
+              </a:solidFill>
+            </a:endParaRPr>
+          </a:p>
+          <a:p>
+            <a:pPr lvl="1"/>
+            <a:r>
+              <a:rPr lang="en-US" dirty="0" smtClean="0">
+                <a:solidFill>
+                  <a:schemeClr val="tx1"/>
+                </a:solidFill>
+              </a:rPr>
+              <a:t>The primary mode of communication is conversation. Documents may be created, but </a:t>
+            </a:r>
+            <a:r>
+              <a:rPr lang="en-US" b="1" dirty="0" smtClean="0">
+                <a:solidFill>
+                  <a:schemeClr val="tx1"/>
+                </a:solidFill>
+              </a:rPr>
+              <a:t>there is no attempt to capture all project information in writing</a:t>
+            </a:r>
+            <a:r>
+              <a:rPr lang="en-US" dirty="0" smtClean="0">
+                <a:solidFill>
+                  <a:schemeClr val="tx1"/>
+                </a:solidFill>
+              </a:rPr>
+              <a:t>.</a:t>
+            </a:r>
+          </a:p>
+          <a:p>
+            <a:pPr lvl="1"/>
+            <a:r>
+              <a:rPr lang="en-US" dirty="0" smtClean="0">
+                <a:solidFill>
+                  <a:schemeClr val="tx1"/>
+                </a:solidFill>
+              </a:rPr>
+              <a:t>An agile project team does not demand written specs, written plans or written designs.</a:t>
+            </a:r>
+            <a:endParaRPr lang="en-US" dirty="0" smtClean="0">
+              <a:solidFill>
+                <a:schemeClr val="tx1"/>
+              </a:solidFill>
+            </a:endParaRPr>
+          </a:p>
+        </p:txBody>
+      </p:sp>
+    </p:spTree>
+    <p:extLst>
+      <p:ext uri="{BB962C8B-B14F-4D97-AF65-F5344CB8AC3E}">
+        <p14:creationId xmlns:p14="http://schemas.microsoft.com/office/powerpoint/2010/main" val="3373497987"/>
+      </p:ext>
+    </p:extLst>
+  </p:cSld>
+  <p:clrMapOvr>
+    <a:masterClrMapping/>
+  </p:clrMapOvr>
+</p:sld>
+</file>
+
+<file path=ppt/slides/slide18.xml><?xml version="1.0" encoding="utf-8"?>
+<p:sld xmlns:a="http://schemas.openxmlformats.org/drawingml/2006/main" xmlns:r="http://schemas.openxmlformats.org/officeDocument/2006/relationships" xmlns:p="http://schemas.openxmlformats.org/presentationml/2006/main">
+  <p:cSld>
+    <p:spTree>
+      <p:nvGrpSpPr>
+        <p:cNvPr id="1" name=""/>
+        <p:cNvGrpSpPr/>
+        <p:nvPr/>
+      </p:nvGrpSpPr>
+      <p:grpSpPr>
+        <a:xfrm>
+          <a:off x="0" y="0"/>
+          <a:ext cx="0" cy="0"/>
+          <a:chOff x="0" y="0"/>
+          <a:chExt cx="0" cy="0"/>
+        </a:xfrm>
+      </p:grpSpPr>
+      <p:sp>
+        <p:nvSpPr>
+          <p:cNvPr id="2" name="Title 1"/>
+          <p:cNvSpPr>
+            <a:spLocks noGrp="1"/>
+          </p:cNvSpPr>
+          <p:nvPr>
+            <p:ph type="title"/>
+          </p:nvPr>
+        </p:nvSpPr>
+        <p:spPr/>
+        <p:txBody>
+          <a:bodyPr/>
+          <a:lstStyle/>
+          <a:p>
+            <a:r>
+              <a:rPr lang="en-US" sz="3200" b="1" dirty="0" smtClean="0">
+                <a:solidFill>
+                  <a:schemeClr val="tx1"/>
+                </a:solidFill>
+              </a:rPr>
+              <a:t>Agile principles</a:t>
+            </a:r>
+            <a:endParaRPr lang="en-US" dirty="0"/>
+          </a:p>
+        </p:txBody>
+      </p:sp>
+      <p:sp>
+        <p:nvSpPr>
+          <p:cNvPr id="3" name="Content Placeholder 2"/>
+          <p:cNvSpPr>
+            <a:spLocks noGrp="1"/>
+          </p:cNvSpPr>
+          <p:nvPr>
+            <p:ph idx="1"/>
+          </p:nvPr>
+        </p:nvSpPr>
+        <p:spPr/>
+        <p:txBody>
+          <a:bodyPr>
+            <a:normAutofit/>
+          </a:bodyPr>
+          <a:lstStyle/>
+          <a:p>
+            <a:pPr lvl="1"/>
+            <a:r>
+              <a:rPr lang="en-US" sz="2400" b="1" dirty="0" smtClean="0">
+                <a:solidFill>
+                  <a:schemeClr val="tx1"/>
+                </a:solidFill>
+              </a:rPr>
+              <a:t>7- </a:t>
+            </a:r>
+            <a:r>
+              <a:rPr lang="en-US" sz="2400" b="1" dirty="0" smtClean="0">
+                <a:solidFill>
+                  <a:srgbClr val="FF0000"/>
+                </a:solidFill>
+              </a:rPr>
+              <a:t>Working software</a:t>
+            </a:r>
+            <a:r>
+              <a:rPr lang="en-US" sz="2400" b="1" dirty="0" smtClean="0">
+                <a:solidFill>
+                  <a:schemeClr val="tx1"/>
+                </a:solidFill>
+              </a:rPr>
+              <a:t> is the </a:t>
+            </a:r>
+            <a:r>
+              <a:rPr lang="en-US" sz="2400" b="1" dirty="0" smtClean="0">
+                <a:solidFill>
+                  <a:srgbClr val="FF0000"/>
+                </a:solidFill>
+              </a:rPr>
+              <a:t>primary measure </a:t>
+            </a:r>
+            <a:r>
+              <a:rPr lang="en-US" sz="2400" b="1" dirty="0" smtClean="0">
+                <a:solidFill>
+                  <a:srgbClr val="FF0000"/>
+                </a:solidFill>
+              </a:rPr>
+              <a:t>of progress</a:t>
+            </a:r>
+            <a:r>
+              <a:rPr lang="en-US" sz="2400" b="1" dirty="0" smtClean="0">
+                <a:solidFill>
+                  <a:schemeClr val="tx1"/>
+                </a:solidFill>
+              </a:rPr>
+              <a:t>.</a:t>
+            </a:r>
+          </a:p>
+          <a:p>
+            <a:pPr lvl="1"/>
+            <a:endParaRPr lang="en-US" sz="2400" b="1" dirty="0">
+              <a:solidFill>
+                <a:schemeClr val="tx1"/>
+              </a:solidFill>
+            </a:endParaRPr>
+          </a:p>
+          <a:p>
+            <a:pPr lvl="1"/>
+            <a:r>
+              <a:rPr lang="en-US" b="1" dirty="0" smtClean="0">
+                <a:solidFill>
+                  <a:schemeClr val="tx1"/>
+                </a:solidFill>
+              </a:rPr>
+              <a:t>Agile team don’t measure their progress </a:t>
+            </a:r>
+            <a:r>
+              <a:rPr lang="en-US" dirty="0" smtClean="0">
+                <a:solidFill>
+                  <a:schemeClr val="tx1"/>
+                </a:solidFill>
+              </a:rPr>
+              <a:t>in terms of phase that they are in or </a:t>
+            </a:r>
+            <a:r>
+              <a:rPr lang="en-US" b="1" dirty="0" smtClean="0">
+                <a:solidFill>
+                  <a:schemeClr val="tx1"/>
+                </a:solidFill>
+              </a:rPr>
+              <a:t>by the amount of infrastructure code they have created</a:t>
+            </a:r>
+            <a:r>
+              <a:rPr lang="en-US" dirty="0" smtClean="0">
+                <a:solidFill>
+                  <a:schemeClr val="tx1"/>
+                </a:solidFill>
+              </a:rPr>
+              <a:t>.</a:t>
+            </a:r>
+          </a:p>
+          <a:p>
+            <a:pPr lvl="1"/>
+            <a:r>
+              <a:rPr lang="en-US" dirty="0" smtClean="0">
+                <a:solidFill>
+                  <a:schemeClr val="tx1"/>
+                </a:solidFill>
+              </a:rPr>
+              <a:t>They are 30% done when 30% of the necessary functionality is working.</a:t>
+            </a:r>
+            <a:endParaRPr lang="en-US" dirty="0" smtClean="0">
+              <a:solidFill>
+                <a:schemeClr val="tx1"/>
+              </a:solidFill>
+            </a:endParaRPr>
+          </a:p>
+        </p:txBody>
+      </p:sp>
+    </p:spTree>
+    <p:extLst>
+      <p:ext uri="{BB962C8B-B14F-4D97-AF65-F5344CB8AC3E}">
+        <p14:creationId xmlns:p14="http://schemas.microsoft.com/office/powerpoint/2010/main" val="6786080"/>
+      </p:ext>
+    </p:extLst>
+  </p:cSld>
+  <p:clrMapOvr>
+    <a:masterClrMapping/>
+  </p:clrMapOvr>
+</p:sld>
+</file>
+
+<file path=ppt/slides/slide19.xml><?xml version="1.0" encoding="utf-8"?>
+<p:sld xmlns:a="http://schemas.openxmlformats.org/drawingml/2006/main" xmlns:r="http://schemas.openxmlformats.org/officeDocument/2006/relationships" xmlns:p="http://schemas.openxmlformats.org/presentationml/2006/main">
+  <p:cSld>
+    <p:spTree>
+      <p:nvGrpSpPr>
+        <p:cNvPr id="1" name=""/>
+        <p:cNvGrpSpPr/>
+        <p:nvPr/>
+      </p:nvGrpSpPr>
+      <p:grpSpPr>
+        <a:xfrm>
+          <a:off x="0" y="0"/>
+          <a:ext cx="0" cy="0"/>
+          <a:chOff x="0" y="0"/>
+          <a:chExt cx="0" cy="0"/>
+        </a:xfrm>
+      </p:grpSpPr>
+      <p:sp>
+        <p:nvSpPr>
+          <p:cNvPr id="2" name="Title 1"/>
+          <p:cNvSpPr>
+            <a:spLocks noGrp="1"/>
+          </p:cNvSpPr>
+          <p:nvPr>
+            <p:ph type="title"/>
+          </p:nvPr>
+        </p:nvSpPr>
+        <p:spPr/>
+        <p:txBody>
+          <a:bodyPr/>
+          <a:lstStyle/>
+          <a:p>
+            <a:r>
+              <a:rPr lang="en-US" sz="3200" b="1" dirty="0" smtClean="0">
+                <a:solidFill>
+                  <a:schemeClr val="tx1"/>
+                </a:solidFill>
+              </a:rPr>
+              <a:t>Agile principles</a:t>
+            </a:r>
+            <a:endParaRPr lang="en-US" dirty="0"/>
+          </a:p>
+        </p:txBody>
+      </p:sp>
+      <p:sp>
+        <p:nvSpPr>
+          <p:cNvPr id="3" name="Content Placeholder 2"/>
+          <p:cNvSpPr>
+            <a:spLocks noGrp="1"/>
+          </p:cNvSpPr>
+          <p:nvPr>
+            <p:ph idx="1"/>
+          </p:nvPr>
+        </p:nvSpPr>
+        <p:spPr/>
+        <p:txBody>
+          <a:bodyPr>
+            <a:normAutofit/>
+          </a:bodyPr>
+          <a:lstStyle/>
+          <a:p>
+            <a:pPr lvl="1"/>
+            <a:r>
+              <a:rPr lang="en-US" sz="2400" b="1" dirty="0" smtClean="0">
+                <a:solidFill>
+                  <a:schemeClr val="tx1"/>
+                </a:solidFill>
+              </a:rPr>
+              <a:t>8- </a:t>
+            </a:r>
+            <a:r>
+              <a:rPr lang="en-US" sz="2400" b="1" dirty="0" smtClean="0">
+                <a:solidFill>
+                  <a:srgbClr val="FF0000"/>
+                </a:solidFill>
+              </a:rPr>
+              <a:t>Agile processes promote sustainable development</a:t>
+            </a:r>
+            <a:r>
+              <a:rPr lang="en-US" sz="2400" b="1" dirty="0" smtClean="0">
+                <a:solidFill>
+                  <a:schemeClr val="tx1"/>
+                </a:solidFill>
+              </a:rPr>
+              <a:t>. The sponsors</a:t>
+            </a:r>
+            <a:r>
+              <a:rPr lang="en-US" sz="2400" b="1" dirty="0" smtClean="0">
+                <a:solidFill>
+                  <a:schemeClr val="tx1"/>
+                </a:solidFill>
+              </a:rPr>
+              <a:t>, developers, and users should be able to maintain a constant pace indefinitely.</a:t>
+            </a:r>
+            <a:endParaRPr lang="en-US" sz="2400" b="1" dirty="0" smtClean="0">
+              <a:solidFill>
+                <a:schemeClr val="tx1"/>
+              </a:solidFill>
+            </a:endParaRPr>
+          </a:p>
+          <a:p>
+            <a:pPr lvl="1"/>
+            <a:endParaRPr lang="en-US" sz="2400" b="1" dirty="0">
+              <a:solidFill>
+                <a:schemeClr val="tx1"/>
+              </a:solidFill>
+            </a:endParaRPr>
+          </a:p>
+          <a:p>
+            <a:pPr lvl="1"/>
+            <a:r>
+              <a:rPr lang="en-US" b="1" dirty="0" smtClean="0">
+                <a:solidFill>
+                  <a:schemeClr val="tx1"/>
+                </a:solidFill>
+              </a:rPr>
+              <a:t>The agile team does not take off at full speed </a:t>
+            </a:r>
+            <a:r>
+              <a:rPr lang="en-US" dirty="0" smtClean="0">
+                <a:solidFill>
+                  <a:schemeClr val="tx1"/>
+                </a:solidFill>
+              </a:rPr>
+              <a:t>and try to maintain that speed for duration. Rather they run at a fast, but sustainable, pace.</a:t>
+            </a:r>
+          </a:p>
+          <a:p>
+            <a:pPr lvl="1"/>
+            <a:r>
+              <a:rPr lang="en-US" b="1" dirty="0" smtClean="0">
+                <a:solidFill>
+                  <a:srgbClr val="FF0000"/>
+                </a:solidFill>
+              </a:rPr>
+              <a:t>They work at a rate that allows them to maintain the highest quality standards</a:t>
+            </a:r>
+            <a:r>
+              <a:rPr lang="en-US" dirty="0" smtClean="0">
+                <a:solidFill>
+                  <a:schemeClr val="tx1"/>
+                </a:solidFill>
+              </a:rPr>
+              <a:t> for the duration of the project.</a:t>
+            </a:r>
+          </a:p>
+        </p:txBody>
+      </p:sp>
+    </p:spTree>
+    <p:extLst>
+      <p:ext uri="{BB962C8B-B14F-4D97-AF65-F5344CB8AC3E}">
+        <p14:creationId xmlns:p14="http://schemas.microsoft.com/office/powerpoint/2010/main" val="1621845704"/>
       </p:ext>
     </p:extLst>
   </p:cSld>
@@ -3950,6 +5699,675 @@
     <p:extLst>
       <p:ext uri="{BB962C8B-B14F-4D97-AF65-F5344CB8AC3E}">
         <p14:creationId xmlns:p14="http://schemas.microsoft.com/office/powerpoint/2010/main" val="1518434223"/>
+      </p:ext>
+    </p:extLst>
+  </p:cSld>
+  <p:clrMapOvr>
+    <a:masterClrMapping/>
+  </p:clrMapOvr>
+</p:sld>
+</file>
+
+<file path=ppt/slides/slide20.xml><?xml version="1.0" encoding="utf-8"?>
+<p:sld xmlns:a="http://schemas.openxmlformats.org/drawingml/2006/main" xmlns:r="http://schemas.openxmlformats.org/officeDocument/2006/relationships" xmlns:p="http://schemas.openxmlformats.org/presentationml/2006/main">
+  <p:cSld>
+    <p:spTree>
+      <p:nvGrpSpPr>
+        <p:cNvPr id="1" name=""/>
+        <p:cNvGrpSpPr/>
+        <p:nvPr/>
+      </p:nvGrpSpPr>
+      <p:grpSpPr>
+        <a:xfrm>
+          <a:off x="0" y="0"/>
+          <a:ext cx="0" cy="0"/>
+          <a:chOff x="0" y="0"/>
+          <a:chExt cx="0" cy="0"/>
+        </a:xfrm>
+      </p:grpSpPr>
+      <p:sp>
+        <p:nvSpPr>
+          <p:cNvPr id="2" name="Title 1"/>
+          <p:cNvSpPr>
+            <a:spLocks noGrp="1"/>
+          </p:cNvSpPr>
+          <p:nvPr>
+            <p:ph type="title"/>
+          </p:nvPr>
+        </p:nvSpPr>
+        <p:spPr/>
+        <p:txBody>
+          <a:bodyPr/>
+          <a:lstStyle/>
+          <a:p>
+            <a:r>
+              <a:rPr lang="en-US" sz="3200" b="1" dirty="0" smtClean="0">
+                <a:solidFill>
+                  <a:schemeClr val="tx1"/>
+                </a:solidFill>
+              </a:rPr>
+              <a:t>Agile principles</a:t>
+            </a:r>
+            <a:endParaRPr lang="en-US" dirty="0"/>
+          </a:p>
+        </p:txBody>
+      </p:sp>
+      <p:sp>
+        <p:nvSpPr>
+          <p:cNvPr id="3" name="Content Placeholder 2"/>
+          <p:cNvSpPr>
+            <a:spLocks noGrp="1"/>
+          </p:cNvSpPr>
+          <p:nvPr>
+            <p:ph idx="1"/>
+          </p:nvPr>
+        </p:nvSpPr>
+        <p:spPr/>
+        <p:txBody>
+          <a:bodyPr>
+            <a:normAutofit/>
+          </a:bodyPr>
+          <a:lstStyle/>
+          <a:p>
+            <a:pPr lvl="1"/>
+            <a:r>
+              <a:rPr lang="en-US" sz="2400" b="1" dirty="0" smtClean="0">
+                <a:solidFill>
+                  <a:schemeClr val="tx1"/>
+                </a:solidFill>
+              </a:rPr>
+              <a:t>9- </a:t>
+            </a:r>
+            <a:r>
+              <a:rPr lang="en-US" sz="2400" b="1" dirty="0" smtClean="0">
+                <a:solidFill>
+                  <a:srgbClr val="FF0000"/>
+                </a:solidFill>
+              </a:rPr>
+              <a:t>Continuous attention to technical excellence</a:t>
+            </a:r>
+            <a:r>
+              <a:rPr lang="en-US" sz="2400" b="1" dirty="0" smtClean="0">
+                <a:solidFill>
+                  <a:schemeClr val="tx1"/>
+                </a:solidFill>
+              </a:rPr>
+              <a:t> and good design enhances agility.</a:t>
+            </a:r>
+          </a:p>
+          <a:p>
+            <a:pPr lvl="1"/>
+            <a:endParaRPr lang="en-US" sz="2400" b="1" dirty="0">
+              <a:solidFill>
+                <a:schemeClr val="tx1"/>
+              </a:solidFill>
+            </a:endParaRPr>
+          </a:p>
+          <a:p>
+            <a:pPr lvl="1"/>
+            <a:r>
+              <a:rPr lang="en-US" b="1" dirty="0" smtClean="0">
+                <a:solidFill>
+                  <a:srgbClr val="FF0000"/>
+                </a:solidFill>
+              </a:rPr>
+              <a:t>High quality is the key to high speed</a:t>
+            </a:r>
+            <a:r>
+              <a:rPr lang="en-US" b="1" dirty="0" smtClean="0">
+                <a:solidFill>
+                  <a:schemeClr val="tx1"/>
+                </a:solidFill>
+              </a:rPr>
+              <a:t>. </a:t>
+            </a:r>
+            <a:r>
+              <a:rPr lang="en-US" dirty="0" smtClean="0">
+                <a:solidFill>
+                  <a:schemeClr val="tx1"/>
+                </a:solidFill>
+              </a:rPr>
+              <a:t>The way to go fast is to keep the software as clean and robust as possible.</a:t>
+            </a:r>
+          </a:p>
+          <a:p>
+            <a:pPr lvl="1"/>
+            <a:r>
+              <a:rPr lang="en-US" dirty="0" smtClean="0">
+                <a:solidFill>
+                  <a:schemeClr val="tx1"/>
+                </a:solidFill>
+              </a:rPr>
+              <a:t>They don’t make messes and then tell themselves they'll clean it when they have more time.</a:t>
+            </a:r>
+          </a:p>
+        </p:txBody>
+      </p:sp>
+    </p:spTree>
+    <p:extLst>
+      <p:ext uri="{BB962C8B-B14F-4D97-AF65-F5344CB8AC3E}">
+        <p14:creationId xmlns:p14="http://schemas.microsoft.com/office/powerpoint/2010/main" val="1783716179"/>
+      </p:ext>
+    </p:extLst>
+  </p:cSld>
+  <p:clrMapOvr>
+    <a:masterClrMapping/>
+  </p:clrMapOvr>
+</p:sld>
+</file>
+
+<file path=ppt/slides/slide21.xml><?xml version="1.0" encoding="utf-8"?>
+<p:sld xmlns:a="http://schemas.openxmlformats.org/drawingml/2006/main" xmlns:r="http://schemas.openxmlformats.org/officeDocument/2006/relationships" xmlns:p="http://schemas.openxmlformats.org/presentationml/2006/main">
+  <p:cSld>
+    <p:spTree>
+      <p:nvGrpSpPr>
+        <p:cNvPr id="1" name=""/>
+        <p:cNvGrpSpPr/>
+        <p:nvPr/>
+      </p:nvGrpSpPr>
+      <p:grpSpPr>
+        <a:xfrm>
+          <a:off x="0" y="0"/>
+          <a:ext cx="0" cy="0"/>
+          <a:chOff x="0" y="0"/>
+          <a:chExt cx="0" cy="0"/>
+        </a:xfrm>
+      </p:grpSpPr>
+      <p:sp>
+        <p:nvSpPr>
+          <p:cNvPr id="2" name="Title 1"/>
+          <p:cNvSpPr>
+            <a:spLocks noGrp="1"/>
+          </p:cNvSpPr>
+          <p:nvPr>
+            <p:ph type="title"/>
+          </p:nvPr>
+        </p:nvSpPr>
+        <p:spPr/>
+        <p:txBody>
+          <a:bodyPr/>
+          <a:lstStyle/>
+          <a:p>
+            <a:r>
+              <a:rPr lang="en-US" sz="3200" b="1" dirty="0" smtClean="0">
+                <a:solidFill>
+                  <a:schemeClr val="tx1"/>
+                </a:solidFill>
+              </a:rPr>
+              <a:t>Agile principles</a:t>
+            </a:r>
+            <a:endParaRPr lang="en-US" dirty="0"/>
+          </a:p>
+        </p:txBody>
+      </p:sp>
+      <p:sp>
+        <p:nvSpPr>
+          <p:cNvPr id="3" name="Content Placeholder 2"/>
+          <p:cNvSpPr>
+            <a:spLocks noGrp="1"/>
+          </p:cNvSpPr>
+          <p:nvPr>
+            <p:ph idx="1"/>
+          </p:nvPr>
+        </p:nvSpPr>
+        <p:spPr/>
+        <p:txBody>
+          <a:bodyPr>
+            <a:normAutofit/>
+          </a:bodyPr>
+          <a:lstStyle/>
+          <a:p>
+            <a:pPr lvl="1"/>
+            <a:r>
+              <a:rPr lang="en-US" sz="2400" b="1" dirty="0" smtClean="0">
+                <a:solidFill>
+                  <a:schemeClr val="tx1"/>
+                </a:solidFill>
+              </a:rPr>
+              <a:t>10- Simplicity—the art of maximizing the amount of work not done—is essential</a:t>
+            </a:r>
+          </a:p>
+          <a:p>
+            <a:pPr lvl="1"/>
+            <a:endParaRPr lang="en-US" sz="2400" b="1" dirty="0">
+              <a:solidFill>
+                <a:schemeClr val="tx1"/>
+              </a:solidFill>
+            </a:endParaRPr>
+          </a:p>
+          <a:p>
+            <a:pPr lvl="1"/>
+            <a:endParaRPr lang="en-US" sz="2400" b="1" dirty="0" smtClean="0">
+              <a:solidFill>
+                <a:schemeClr val="tx1"/>
+              </a:solidFill>
+            </a:endParaRPr>
+          </a:p>
+          <a:p>
+            <a:pPr lvl="1"/>
+            <a:endParaRPr lang="en-US" sz="2400" b="1" dirty="0">
+              <a:solidFill>
+                <a:schemeClr val="tx1"/>
+              </a:solidFill>
+            </a:endParaRPr>
+          </a:p>
+        </p:txBody>
+      </p:sp>
+    </p:spTree>
+    <p:extLst>
+      <p:ext uri="{BB962C8B-B14F-4D97-AF65-F5344CB8AC3E}">
+        <p14:creationId xmlns:p14="http://schemas.microsoft.com/office/powerpoint/2010/main" val="3264131792"/>
+      </p:ext>
+    </p:extLst>
+  </p:cSld>
+  <p:clrMapOvr>
+    <a:masterClrMapping/>
+  </p:clrMapOvr>
+</p:sld>
+</file>
+
+<file path=ppt/slides/slide22.xml><?xml version="1.0" encoding="utf-8"?>
+<p:sld xmlns:a="http://schemas.openxmlformats.org/drawingml/2006/main" xmlns:r="http://schemas.openxmlformats.org/officeDocument/2006/relationships" xmlns:p="http://schemas.openxmlformats.org/presentationml/2006/main">
+  <p:cSld>
+    <p:spTree>
+      <p:nvGrpSpPr>
+        <p:cNvPr id="1" name=""/>
+        <p:cNvGrpSpPr/>
+        <p:nvPr/>
+      </p:nvGrpSpPr>
+      <p:grpSpPr>
+        <a:xfrm>
+          <a:off x="0" y="0"/>
+          <a:ext cx="0" cy="0"/>
+          <a:chOff x="0" y="0"/>
+          <a:chExt cx="0" cy="0"/>
+        </a:xfrm>
+      </p:grpSpPr>
+      <p:sp>
+        <p:nvSpPr>
+          <p:cNvPr id="2" name="Title 1"/>
+          <p:cNvSpPr>
+            <a:spLocks noGrp="1"/>
+          </p:cNvSpPr>
+          <p:nvPr>
+            <p:ph type="title"/>
+          </p:nvPr>
+        </p:nvSpPr>
+        <p:spPr/>
+        <p:txBody>
+          <a:bodyPr/>
+          <a:lstStyle/>
+          <a:p>
+            <a:r>
+              <a:rPr lang="en-US" sz="3200" b="1" dirty="0" smtClean="0">
+                <a:solidFill>
+                  <a:schemeClr val="tx1"/>
+                </a:solidFill>
+              </a:rPr>
+              <a:t>Agile principles</a:t>
+            </a:r>
+            <a:endParaRPr lang="en-US" dirty="0"/>
+          </a:p>
+        </p:txBody>
+      </p:sp>
+      <p:sp>
+        <p:nvSpPr>
+          <p:cNvPr id="3" name="Content Placeholder 2"/>
+          <p:cNvSpPr>
+            <a:spLocks noGrp="1"/>
+          </p:cNvSpPr>
+          <p:nvPr>
+            <p:ph idx="1"/>
+          </p:nvPr>
+        </p:nvSpPr>
+        <p:spPr/>
+        <p:txBody>
+          <a:bodyPr>
+            <a:normAutofit/>
+          </a:bodyPr>
+          <a:lstStyle/>
+          <a:p>
+            <a:pPr lvl="1"/>
+            <a:r>
+              <a:rPr lang="en-US" sz="2400" b="1" dirty="0" smtClean="0">
+                <a:solidFill>
+                  <a:schemeClr val="tx1"/>
+                </a:solidFill>
+              </a:rPr>
+              <a:t>11- </a:t>
+            </a:r>
+            <a:r>
+              <a:rPr lang="en-US" sz="2400" b="1" dirty="0">
+                <a:solidFill>
+                  <a:schemeClr val="tx1"/>
+                </a:solidFill>
+              </a:rPr>
+              <a:t>The best architectures, requirements, designs </a:t>
+            </a:r>
+            <a:r>
+              <a:rPr lang="en-US" sz="2400" b="1" dirty="0">
+                <a:solidFill>
+                  <a:srgbClr val="FF0000"/>
+                </a:solidFill>
+              </a:rPr>
+              <a:t>emerge from self-organizing </a:t>
+            </a:r>
+            <a:r>
+              <a:rPr lang="en-US" sz="2400" b="1" dirty="0" smtClean="0">
+                <a:solidFill>
+                  <a:srgbClr val="FF0000"/>
+                </a:solidFill>
+              </a:rPr>
+              <a:t>teams.</a:t>
+            </a:r>
+          </a:p>
+          <a:p>
+            <a:pPr marL="201168" lvl="1" indent="0">
+              <a:buNone/>
+            </a:pPr>
+            <a:endParaRPr lang="en-US" sz="2400" b="1" dirty="0" smtClean="0">
+              <a:solidFill>
+                <a:schemeClr val="tx1"/>
+              </a:solidFill>
+            </a:endParaRPr>
+          </a:p>
+          <a:p>
+            <a:pPr lvl="1">
+              <a:buClr>
+                <a:srgbClr val="1CADE4"/>
+              </a:buClr>
+            </a:pPr>
+            <a:r>
+              <a:rPr lang="en-US" dirty="0" smtClean="0">
+                <a:solidFill>
+                  <a:prstClr val="black"/>
+                </a:solidFill>
+              </a:rPr>
+              <a:t>An agile team is a self-organizing team. </a:t>
+            </a:r>
+            <a:r>
+              <a:rPr lang="en-US" b="1" dirty="0" smtClean="0">
+                <a:solidFill>
+                  <a:prstClr val="black"/>
+                </a:solidFill>
+              </a:rPr>
+              <a:t>Responsibilities are not handed to individuals team members from the outside.</a:t>
+            </a:r>
+          </a:p>
+          <a:p>
+            <a:pPr lvl="1">
+              <a:buClr>
+                <a:srgbClr val="1CADE4"/>
+              </a:buClr>
+            </a:pPr>
+            <a:r>
+              <a:rPr lang="en-US" dirty="0" smtClean="0">
+                <a:solidFill>
+                  <a:prstClr val="black"/>
+                </a:solidFill>
+              </a:rPr>
+              <a:t>Responsibilities are communicated to the team as whole, and </a:t>
+            </a:r>
+            <a:r>
+              <a:rPr lang="en-US" b="1" dirty="0" smtClean="0">
+                <a:solidFill>
+                  <a:prstClr val="black"/>
+                </a:solidFill>
+              </a:rPr>
+              <a:t>the team determines the best way to fulfill them.</a:t>
+            </a:r>
+            <a:endParaRPr lang="en-US" sz="2400" b="1" dirty="0">
+              <a:solidFill>
+                <a:prstClr val="black"/>
+              </a:solidFill>
+            </a:endParaRPr>
+          </a:p>
+          <a:p>
+            <a:pPr lvl="1">
+              <a:buClr>
+                <a:srgbClr val="1CADE4"/>
+              </a:buClr>
+            </a:pPr>
+            <a:endParaRPr lang="en-US" sz="2400" b="1" dirty="0">
+              <a:solidFill>
+                <a:schemeClr val="tx1"/>
+              </a:solidFill>
+            </a:endParaRPr>
+          </a:p>
+          <a:p>
+            <a:pPr lvl="1"/>
+            <a:endParaRPr lang="en-US" sz="2400" b="1" dirty="0">
+              <a:solidFill>
+                <a:schemeClr val="tx1"/>
+              </a:solidFill>
+            </a:endParaRPr>
+          </a:p>
+          <a:p>
+            <a:pPr lvl="1"/>
+            <a:endParaRPr lang="en-US" sz="2400" b="1" dirty="0">
+              <a:solidFill>
+                <a:schemeClr val="tx1"/>
+              </a:solidFill>
+            </a:endParaRPr>
+          </a:p>
+        </p:txBody>
+      </p:sp>
+    </p:spTree>
+    <p:extLst>
+      <p:ext uri="{BB962C8B-B14F-4D97-AF65-F5344CB8AC3E}">
+        <p14:creationId xmlns:p14="http://schemas.microsoft.com/office/powerpoint/2010/main" val="3635266435"/>
+      </p:ext>
+    </p:extLst>
+  </p:cSld>
+  <p:clrMapOvr>
+    <a:masterClrMapping/>
+  </p:clrMapOvr>
+</p:sld>
+</file>
+
+<file path=ppt/slides/slide23.xml><?xml version="1.0" encoding="utf-8"?>
+<p:sld xmlns:a="http://schemas.openxmlformats.org/drawingml/2006/main" xmlns:r="http://schemas.openxmlformats.org/officeDocument/2006/relationships" xmlns:p="http://schemas.openxmlformats.org/presentationml/2006/main">
+  <p:cSld>
+    <p:spTree>
+      <p:nvGrpSpPr>
+        <p:cNvPr id="1" name=""/>
+        <p:cNvGrpSpPr/>
+        <p:nvPr/>
+      </p:nvGrpSpPr>
+      <p:grpSpPr>
+        <a:xfrm>
+          <a:off x="0" y="0"/>
+          <a:ext cx="0" cy="0"/>
+          <a:chOff x="0" y="0"/>
+          <a:chExt cx="0" cy="0"/>
+        </a:xfrm>
+      </p:grpSpPr>
+      <p:sp>
+        <p:nvSpPr>
+          <p:cNvPr id="2" name="Title 1"/>
+          <p:cNvSpPr>
+            <a:spLocks noGrp="1"/>
+          </p:cNvSpPr>
+          <p:nvPr>
+            <p:ph type="title"/>
+          </p:nvPr>
+        </p:nvSpPr>
+        <p:spPr/>
+        <p:txBody>
+          <a:bodyPr/>
+          <a:lstStyle/>
+          <a:p>
+            <a:r>
+              <a:rPr lang="en-US" sz="3200" b="1" dirty="0" smtClean="0">
+                <a:solidFill>
+                  <a:schemeClr val="tx1"/>
+                </a:solidFill>
+              </a:rPr>
+              <a:t>Agile principles</a:t>
+            </a:r>
+            <a:endParaRPr lang="en-US" dirty="0"/>
+          </a:p>
+        </p:txBody>
+      </p:sp>
+      <p:sp>
+        <p:nvSpPr>
+          <p:cNvPr id="3" name="Content Placeholder 2"/>
+          <p:cNvSpPr>
+            <a:spLocks noGrp="1"/>
+          </p:cNvSpPr>
+          <p:nvPr>
+            <p:ph idx="1"/>
+          </p:nvPr>
+        </p:nvSpPr>
+        <p:spPr/>
+        <p:txBody>
+          <a:bodyPr>
+            <a:normAutofit/>
+          </a:bodyPr>
+          <a:lstStyle/>
+          <a:p>
+            <a:pPr lvl="1"/>
+            <a:r>
+              <a:rPr lang="en-US" sz="2400" b="1" dirty="0" smtClean="0">
+                <a:solidFill>
+                  <a:schemeClr val="tx1"/>
+                </a:solidFill>
+              </a:rPr>
+              <a:t>12- </a:t>
+            </a:r>
+            <a:r>
+              <a:rPr lang="en-US" sz="2400" b="1" dirty="0" smtClean="0">
+                <a:solidFill>
+                  <a:srgbClr val="FF0000"/>
+                </a:solidFill>
+              </a:rPr>
+              <a:t>At regular intervals</a:t>
+            </a:r>
+            <a:r>
+              <a:rPr lang="en-US" sz="2400" b="1" dirty="0" smtClean="0">
+                <a:solidFill>
+                  <a:schemeClr val="tx1"/>
+                </a:solidFill>
+              </a:rPr>
+              <a:t>, </a:t>
+            </a:r>
+            <a:r>
+              <a:rPr lang="en-US" sz="2400" b="1" dirty="0" smtClean="0">
+                <a:solidFill>
+                  <a:srgbClr val="FF0000"/>
+                </a:solidFill>
+              </a:rPr>
+              <a:t>the team reflects on how to become more effective</a:t>
+            </a:r>
+            <a:r>
+              <a:rPr lang="en-US" sz="2400" b="1" dirty="0" smtClean="0">
+                <a:solidFill>
+                  <a:schemeClr val="tx1"/>
+                </a:solidFill>
+              </a:rPr>
+              <a:t>, then tunes and adjusts it’s behavior accordingly.</a:t>
+            </a:r>
+            <a:endParaRPr lang="en-US" sz="2400" b="1" dirty="0" smtClean="0">
+              <a:solidFill>
+                <a:srgbClr val="FF0000"/>
+              </a:solidFill>
+            </a:endParaRPr>
+          </a:p>
+          <a:p>
+            <a:pPr marL="201168" lvl="1" indent="0">
+              <a:buNone/>
+            </a:pPr>
+            <a:endParaRPr lang="en-US" sz="2400" b="1" dirty="0" smtClean="0">
+              <a:solidFill>
+                <a:schemeClr val="tx1"/>
+              </a:solidFill>
+            </a:endParaRPr>
+          </a:p>
+          <a:p>
+            <a:pPr lvl="1">
+              <a:buClr>
+                <a:srgbClr val="1CADE4"/>
+              </a:buClr>
+            </a:pPr>
+            <a:r>
+              <a:rPr lang="en-US" dirty="0" smtClean="0">
+                <a:solidFill>
+                  <a:prstClr val="black"/>
+                </a:solidFill>
+              </a:rPr>
+              <a:t>An agile team is a self-organizing team. </a:t>
+            </a:r>
+            <a:r>
+              <a:rPr lang="en-US" b="1" dirty="0" smtClean="0">
+                <a:solidFill>
+                  <a:prstClr val="black"/>
+                </a:solidFill>
+              </a:rPr>
+              <a:t>Responsibilities are not handed to individuals team members from the outside.</a:t>
+            </a:r>
+          </a:p>
+          <a:p>
+            <a:pPr lvl="1">
+              <a:buClr>
+                <a:srgbClr val="1CADE4"/>
+              </a:buClr>
+            </a:pPr>
+            <a:r>
+              <a:rPr lang="en-US" dirty="0" smtClean="0">
+                <a:solidFill>
+                  <a:prstClr val="black"/>
+                </a:solidFill>
+              </a:rPr>
+              <a:t>Responsibilities are communicated to the team as whole, and </a:t>
+            </a:r>
+            <a:r>
+              <a:rPr lang="en-US" b="1" dirty="0" smtClean="0">
+                <a:solidFill>
+                  <a:prstClr val="black"/>
+                </a:solidFill>
+              </a:rPr>
+              <a:t>the team determines the best way to fulfill them.</a:t>
+            </a:r>
+            <a:endParaRPr lang="en-US" sz="2400" b="1" dirty="0">
+              <a:solidFill>
+                <a:prstClr val="black"/>
+              </a:solidFill>
+            </a:endParaRPr>
+          </a:p>
+          <a:p>
+            <a:pPr lvl="1">
+              <a:buClr>
+                <a:srgbClr val="1CADE4"/>
+              </a:buClr>
+            </a:pPr>
+            <a:endParaRPr lang="en-US" sz="2400" b="1" dirty="0">
+              <a:solidFill>
+                <a:schemeClr val="tx1"/>
+              </a:solidFill>
+            </a:endParaRPr>
+          </a:p>
+          <a:p>
+            <a:pPr lvl="1"/>
+            <a:endParaRPr lang="en-US" sz="2400" b="1" dirty="0">
+              <a:solidFill>
+                <a:schemeClr val="tx1"/>
+              </a:solidFill>
+            </a:endParaRPr>
+          </a:p>
+          <a:p>
+            <a:pPr lvl="1"/>
+            <a:endParaRPr lang="en-US" sz="2400" b="1" dirty="0">
+              <a:solidFill>
+                <a:schemeClr val="tx1"/>
+              </a:solidFill>
+            </a:endParaRPr>
+          </a:p>
+        </p:txBody>
+      </p:sp>
+    </p:spTree>
+    <p:extLst>
+      <p:ext uri="{BB962C8B-B14F-4D97-AF65-F5344CB8AC3E}">
+        <p14:creationId xmlns:p14="http://schemas.microsoft.com/office/powerpoint/2010/main" val="182062444"/>
       </p:ext>
     </p:extLst>
   </p:cSld>
@@ -4672,15 +7090,7 @@
                   <a:schemeClr val="tx1"/>
                 </a:solidFill>
               </a:rPr>
-              <a:t> </a:t>
-            </a:r>
-            <a:r>
-              <a:rPr lang="en-US" dirty="0" smtClean="0">
-                <a:solidFill>
-                  <a:schemeClr val="tx1"/>
-                </a:solidFill>
-              </a:rPr>
-              <a:t>and </a:t>
+              <a:t> and </a:t>
             </a:r>
             <a:r>
               <a:rPr lang="en-US" dirty="0">
@@ -5056,6 +7466,218 @@
     <p:extLst>
       <p:ext uri="{BB962C8B-B14F-4D97-AF65-F5344CB8AC3E}">
         <p14:creationId xmlns:p14="http://schemas.microsoft.com/office/powerpoint/2010/main" val="1144780574"/>
+      </p:ext>
+    </p:extLst>
+  </p:cSld>
+  <p:clrMapOvr>
+    <a:masterClrMapping/>
+  </p:clrMapOvr>
+</p:sld>
+</file>
+
+<file path=ppt/slides/slide9.xml><?xml version="1.0" encoding="utf-8"?>
+<p:sld xmlns:a="http://schemas.openxmlformats.org/drawingml/2006/main" xmlns:r="http://schemas.openxmlformats.org/officeDocument/2006/relationships" xmlns:p="http://schemas.openxmlformats.org/presentationml/2006/main">
+  <p:cSld>
+    <p:spTree>
+      <p:nvGrpSpPr>
+        <p:cNvPr id="1" name=""/>
+        <p:cNvGrpSpPr/>
+        <p:nvPr/>
+      </p:nvGrpSpPr>
+      <p:grpSpPr>
+        <a:xfrm>
+          <a:off x="0" y="0"/>
+          <a:ext cx="0" cy="0"/>
+          <a:chOff x="0" y="0"/>
+          <a:chExt cx="0" cy="0"/>
+        </a:xfrm>
+      </p:grpSpPr>
+      <p:sp>
+        <p:nvSpPr>
+          <p:cNvPr id="2" name="Title 1"/>
+          <p:cNvSpPr>
+            <a:spLocks noGrp="1"/>
+          </p:cNvSpPr>
+          <p:nvPr>
+            <p:ph type="title"/>
+          </p:nvPr>
+        </p:nvSpPr>
+        <p:spPr/>
+        <p:txBody>
+          <a:bodyPr/>
+          <a:lstStyle/>
+          <a:p>
+            <a:r>
+              <a:rPr lang="en-US" sz="3200" b="1" dirty="0" smtClean="0">
+                <a:solidFill>
+                  <a:schemeClr val="tx1"/>
+                </a:solidFill>
+              </a:rPr>
+              <a:t>Customer collaboration </a:t>
+            </a:r>
+            <a:r>
+              <a:rPr lang="en-US" sz="3200" dirty="0" smtClean="0">
+                <a:solidFill>
+                  <a:schemeClr val="tx1"/>
+                </a:solidFill>
+              </a:rPr>
+              <a:t>over contract negotiation</a:t>
+            </a:r>
+            <a:endParaRPr lang="en-US" dirty="0"/>
+          </a:p>
+        </p:txBody>
+      </p:sp>
+      <p:sp>
+        <p:nvSpPr>
+          <p:cNvPr id="3" name="Content Placeholder 2"/>
+          <p:cNvSpPr>
+            <a:spLocks noGrp="1"/>
+          </p:cNvSpPr>
+          <p:nvPr>
+            <p:ph idx="1"/>
+          </p:nvPr>
+        </p:nvSpPr>
+        <p:spPr/>
+        <p:txBody>
+          <a:bodyPr>
+            <a:normAutofit/>
+          </a:bodyPr>
+          <a:lstStyle/>
+          <a:p>
+            <a:pPr lvl="1"/>
+            <a:r>
+              <a:rPr lang="en-US" b="1" dirty="0" smtClean="0">
+                <a:solidFill>
+                  <a:srgbClr val="FF0000"/>
+                </a:solidFill>
+              </a:rPr>
+              <a:t>You cannot </a:t>
+            </a:r>
+            <a:r>
+              <a:rPr lang="en-US" dirty="0" smtClean="0">
+                <a:solidFill>
+                  <a:schemeClr val="tx1"/>
+                </a:solidFill>
+              </a:rPr>
+              <a:t>write a description of the software you want and then have someone develop it on </a:t>
+            </a:r>
+            <a:r>
+              <a:rPr lang="en-US" dirty="0" smtClean="0">
+                <a:solidFill>
+                  <a:schemeClr val="tx1"/>
+                </a:solidFill>
+              </a:rPr>
+              <a:t>a </a:t>
+            </a:r>
+            <a:r>
+              <a:rPr lang="en-US" b="1" dirty="0" smtClean="0">
+                <a:solidFill>
+                  <a:srgbClr val="FF0000"/>
+                </a:solidFill>
+              </a:rPr>
+              <a:t>fixed schedule</a:t>
+            </a:r>
+            <a:r>
+              <a:rPr lang="en-US" dirty="0" smtClean="0">
+                <a:solidFill>
+                  <a:schemeClr val="tx1"/>
+                </a:solidFill>
+              </a:rPr>
+              <a:t> for a </a:t>
+            </a:r>
+            <a:r>
+              <a:rPr lang="en-US" b="1" dirty="0" smtClean="0">
+                <a:solidFill>
+                  <a:srgbClr val="FF0000"/>
+                </a:solidFill>
+              </a:rPr>
+              <a:t>fixed price</a:t>
+            </a:r>
+            <a:r>
+              <a:rPr lang="en-US" dirty="0" smtClean="0">
+                <a:solidFill>
+                  <a:schemeClr val="tx1"/>
+                </a:solidFill>
+              </a:rPr>
+              <a:t>.</a:t>
+            </a:r>
+          </a:p>
+          <a:p>
+            <a:pPr lvl="1"/>
+            <a:r>
+              <a:rPr lang="en-US" b="1" dirty="0" smtClean="0">
+                <a:solidFill>
+                  <a:schemeClr val="tx1"/>
+                </a:solidFill>
+              </a:rPr>
+              <a:t>Successful projects </a:t>
+            </a:r>
+            <a:r>
+              <a:rPr lang="en-US" dirty="0" smtClean="0">
+                <a:solidFill>
+                  <a:schemeClr val="tx1"/>
+                </a:solidFill>
+              </a:rPr>
+              <a:t>involve </a:t>
+            </a:r>
+            <a:r>
+              <a:rPr lang="en-US" b="1" dirty="0" smtClean="0">
+                <a:solidFill>
+                  <a:schemeClr val="tx1"/>
+                </a:solidFill>
+              </a:rPr>
+              <a:t>customer feedback </a:t>
+            </a:r>
+            <a:r>
+              <a:rPr lang="en-US" dirty="0" smtClean="0">
+                <a:solidFill>
+                  <a:schemeClr val="tx1"/>
+                </a:solidFill>
+              </a:rPr>
+              <a:t>on a regular frequent basis.</a:t>
+            </a:r>
+          </a:p>
+          <a:p>
+            <a:pPr lvl="1"/>
+            <a:endParaRPr lang="en-US" dirty="0">
+              <a:solidFill>
+                <a:schemeClr val="tx1"/>
+              </a:solidFill>
+            </a:endParaRPr>
+          </a:p>
+          <a:p>
+            <a:pPr lvl="1"/>
+            <a:r>
+              <a:rPr lang="en-US" sz="3200" b="1" dirty="0" smtClean="0">
+                <a:solidFill>
+                  <a:srgbClr val="FF0000"/>
+                </a:solidFill>
+              </a:rPr>
+              <a:t>A contract that specifies the requirements, schedule and cost of a project is fundamentally flawed.</a:t>
+            </a:r>
+          </a:p>
+          <a:p>
+            <a:pPr lvl="1"/>
+            <a:endParaRPr lang="en-US" b="1" dirty="0" smtClean="0">
+              <a:solidFill>
+                <a:srgbClr val="FF0000"/>
+              </a:solidFill>
+            </a:endParaRPr>
+          </a:p>
+          <a:p>
+            <a:pPr lvl="1"/>
+            <a:endParaRPr lang="en-US" dirty="0" smtClean="0">
+              <a:solidFill>
+                <a:schemeClr val="tx1"/>
+              </a:solidFill>
+            </a:endParaRPr>
+          </a:p>
+        </p:txBody>
+      </p:sp>
+    </p:spTree>
+    <p:extLst>
+      <p:ext uri="{BB962C8B-B14F-4D97-AF65-F5344CB8AC3E}">
+        <p14:creationId xmlns:p14="http://schemas.microsoft.com/office/powerpoint/2010/main" val="131581117"/>
       </p:ext>
     </p:extLst>
   </p:cSld>

</xml_diff>